<commit_message>
Created Cards with Icon
</commit_message>
<xml_diff>
--- a/Power_BI_Project_Assignments/Icons.pptx
+++ b/Power_BI_Project_Assignments/Icons.pptx
@@ -6,6 +6,7 @@
   </p:sldMasterIdLst>
   <p:sldIdLst>
     <p:sldId id="256" r:id="rId2"/>
+    <p:sldId id="257" r:id="rId3"/>
   </p:sldIdLst>
   <p:sldSz cx="12192000" cy="6858000"/>
   <p:notesSz cx="6858000" cy="9144000"/>
@@ -104,6 +105,11 @@
       </a:defRPr>
     </a:lvl9pPr>
   </p:defaultTextStyle>
+  <p:extLst>
+    <p:ext uri="{EFAFB233-063F-42B5-8137-9DF3F51BA10A}">
+      <p15:sldGuideLst xmlns:p15="http://schemas.microsoft.com/office/powerpoint/2012/main"/>
+    </p:ext>
+  </p:extLst>
 </p:presentation>
 </file>
 
@@ -256,7 +262,7 @@
           <a:p>
             <a:fld id="{28E05424-D9A3-49CC-9B54-DFC4393D1FDE}" type="datetimeFigureOut">
               <a:rPr lang="en-IN" smtClean="0"/>
-              <a:t>31-10-2022</a:t>
+              <a:t>02-11-2022</a:t>
             </a:fld>
             <a:endParaRPr lang="en-IN"/>
           </a:p>
@@ -456,7 +462,7 @@
           <a:p>
             <a:fld id="{28E05424-D9A3-49CC-9B54-DFC4393D1FDE}" type="datetimeFigureOut">
               <a:rPr lang="en-IN" smtClean="0"/>
-              <a:t>31-10-2022</a:t>
+              <a:t>02-11-2022</a:t>
             </a:fld>
             <a:endParaRPr lang="en-IN"/>
           </a:p>
@@ -666,7 +672,7 @@
           <a:p>
             <a:fld id="{28E05424-D9A3-49CC-9B54-DFC4393D1FDE}" type="datetimeFigureOut">
               <a:rPr lang="en-IN" smtClean="0"/>
-              <a:t>31-10-2022</a:t>
+              <a:t>02-11-2022</a:t>
             </a:fld>
             <a:endParaRPr lang="en-IN"/>
           </a:p>
@@ -866,7 +872,7 @@
           <a:p>
             <a:fld id="{28E05424-D9A3-49CC-9B54-DFC4393D1FDE}" type="datetimeFigureOut">
               <a:rPr lang="en-IN" smtClean="0"/>
-              <a:t>31-10-2022</a:t>
+              <a:t>02-11-2022</a:t>
             </a:fld>
             <a:endParaRPr lang="en-IN"/>
           </a:p>
@@ -1142,7 +1148,7 @@
           <a:p>
             <a:fld id="{28E05424-D9A3-49CC-9B54-DFC4393D1FDE}" type="datetimeFigureOut">
               <a:rPr lang="en-IN" smtClean="0"/>
-              <a:t>31-10-2022</a:t>
+              <a:t>02-11-2022</a:t>
             </a:fld>
             <a:endParaRPr lang="en-IN"/>
           </a:p>
@@ -1410,7 +1416,7 @@
           <a:p>
             <a:fld id="{28E05424-D9A3-49CC-9B54-DFC4393D1FDE}" type="datetimeFigureOut">
               <a:rPr lang="en-IN" smtClean="0"/>
-              <a:t>31-10-2022</a:t>
+              <a:t>02-11-2022</a:t>
             </a:fld>
             <a:endParaRPr lang="en-IN"/>
           </a:p>
@@ -1825,7 +1831,7 @@
           <a:p>
             <a:fld id="{28E05424-D9A3-49CC-9B54-DFC4393D1FDE}" type="datetimeFigureOut">
               <a:rPr lang="en-IN" smtClean="0"/>
-              <a:t>31-10-2022</a:t>
+              <a:t>02-11-2022</a:t>
             </a:fld>
             <a:endParaRPr lang="en-IN"/>
           </a:p>
@@ -1967,7 +1973,7 @@
           <a:p>
             <a:fld id="{28E05424-D9A3-49CC-9B54-DFC4393D1FDE}" type="datetimeFigureOut">
               <a:rPr lang="en-IN" smtClean="0"/>
-              <a:t>31-10-2022</a:t>
+              <a:t>02-11-2022</a:t>
             </a:fld>
             <a:endParaRPr lang="en-IN"/>
           </a:p>
@@ -2080,7 +2086,7 @@
           <a:p>
             <a:fld id="{28E05424-D9A3-49CC-9B54-DFC4393D1FDE}" type="datetimeFigureOut">
               <a:rPr lang="en-IN" smtClean="0"/>
-              <a:t>31-10-2022</a:t>
+              <a:t>02-11-2022</a:t>
             </a:fld>
             <a:endParaRPr lang="en-IN"/>
           </a:p>
@@ -2393,7 +2399,7 @@
           <a:p>
             <a:fld id="{28E05424-D9A3-49CC-9B54-DFC4393D1FDE}" type="datetimeFigureOut">
               <a:rPr lang="en-IN" smtClean="0"/>
-              <a:t>31-10-2022</a:t>
+              <a:t>02-11-2022</a:t>
             </a:fld>
             <a:endParaRPr lang="en-IN"/>
           </a:p>
@@ -2682,7 +2688,7 @@
           <a:p>
             <a:fld id="{28E05424-D9A3-49CC-9B54-DFC4393D1FDE}" type="datetimeFigureOut">
               <a:rPr lang="en-IN" smtClean="0"/>
-              <a:t>31-10-2022</a:t>
+              <a:t>02-11-2022</a:t>
             </a:fld>
             <a:endParaRPr lang="en-IN"/>
           </a:p>
@@ -2925,7 +2931,7 @@
           <a:p>
             <a:fld id="{28E05424-D9A3-49CC-9B54-DFC4393D1FDE}" type="datetimeFigureOut">
               <a:rPr lang="en-IN" smtClean="0"/>
-              <a:t>31-10-2022</a:t>
+              <a:t>02-11-2022</a:t>
             </a:fld>
             <a:endParaRPr lang="en-IN"/>
           </a:p>
@@ -3472,6 +3478,231 @@
 </p:sld>
 </file>
 
+<file path=ppt/slides/slide2.xml><?xml version="1.0" encoding="utf-8"?>
+<p:sld xmlns:a="http://schemas.openxmlformats.org/drawingml/2006/main" xmlns:r="http://schemas.openxmlformats.org/officeDocument/2006/relationships" xmlns:p="http://schemas.openxmlformats.org/presentationml/2006/main">
+  <p:cSld>
+    <p:spTree>
+      <p:nvGrpSpPr>
+        <p:cNvPr id="1" name=""/>
+        <p:cNvGrpSpPr/>
+        <p:nvPr/>
+      </p:nvGrpSpPr>
+      <p:grpSpPr>
+        <a:xfrm>
+          <a:off x="0" y="0"/>
+          <a:ext cx="0" cy="0"/>
+          <a:chOff x="0" y="0"/>
+          <a:chExt cx="0" cy="0"/>
+        </a:xfrm>
+      </p:grpSpPr>
+      <p:sp>
+        <p:nvSpPr>
+          <p:cNvPr id="13" name="Rectangle: Rounded Corners 12">
+            <a:extLst>
+              <a:ext uri="{FF2B5EF4-FFF2-40B4-BE49-F238E27FC236}">
+                <a16:creationId xmlns:a16="http://schemas.microsoft.com/office/drawing/2014/main" id="{ED0B468A-9F44-0F55-1F3C-82858D5A233A}"/>
+              </a:ext>
+            </a:extLst>
+          </p:cNvPr>
+          <p:cNvSpPr/>
+          <p:nvPr/>
+        </p:nvSpPr>
+        <p:spPr>
+          <a:xfrm>
+            <a:off x="4320046" y="2536720"/>
+            <a:ext cx="2316727" cy="1093843"/>
+          </a:xfrm>
+          <a:prstGeom prst="roundRect">
+            <a:avLst/>
+          </a:prstGeom>
+          <a:solidFill>
+            <a:schemeClr val="bg1"/>
+          </a:solidFill>
+          <a:ln>
+            <a:noFill/>
+          </a:ln>
+        </p:spPr>
+        <p:style>
+          <a:lnRef idx="2">
+            <a:schemeClr val="accent1">
+              <a:shade val="50000"/>
+            </a:schemeClr>
+          </a:lnRef>
+          <a:fillRef idx="1">
+            <a:schemeClr val="accent1"/>
+          </a:fillRef>
+          <a:effectRef idx="0">
+            <a:schemeClr val="accent1"/>
+          </a:effectRef>
+          <a:fontRef idx="minor">
+            <a:schemeClr val="lt1"/>
+          </a:fontRef>
+        </p:style>
+        <p:txBody>
+          <a:bodyPr rtlCol="0" anchor="ctr"/>
+          <a:lstStyle/>
+          <a:p>
+            <a:pPr algn="ctr"/>
+            <a:endParaRPr lang="en-IN"/>
+          </a:p>
+        </p:txBody>
+      </p:sp>
+      <p:sp>
+        <p:nvSpPr>
+          <p:cNvPr id="6" name="Rectangle: Rounded Corners 5">
+            <a:extLst>
+              <a:ext uri="{FF2B5EF4-FFF2-40B4-BE49-F238E27FC236}">
+                <a16:creationId xmlns:a16="http://schemas.microsoft.com/office/drawing/2014/main" id="{1AE21F3E-45FF-0CF0-67CE-0BCF1C555A07}"/>
+              </a:ext>
+            </a:extLst>
+          </p:cNvPr>
+          <p:cNvSpPr/>
+          <p:nvPr/>
+        </p:nvSpPr>
+        <p:spPr>
+          <a:xfrm>
+            <a:off x="3578943" y="2536723"/>
+            <a:ext cx="843114" cy="1101212"/>
+          </a:xfrm>
+          <a:prstGeom prst="roundRect">
+            <a:avLst/>
+          </a:prstGeom>
+          <a:solidFill>
+            <a:srgbClr val="0070C0"/>
+          </a:solidFill>
+          <a:ln>
+            <a:noFill/>
+          </a:ln>
+        </p:spPr>
+        <p:style>
+          <a:lnRef idx="2">
+            <a:schemeClr val="accent1">
+              <a:shade val="50000"/>
+            </a:schemeClr>
+          </a:lnRef>
+          <a:fillRef idx="1">
+            <a:schemeClr val="accent1"/>
+          </a:fillRef>
+          <a:effectRef idx="0">
+            <a:schemeClr val="accent1"/>
+          </a:effectRef>
+          <a:fontRef idx="minor">
+            <a:schemeClr val="lt1"/>
+          </a:fontRef>
+        </p:style>
+        <p:txBody>
+          <a:bodyPr rtlCol="0" anchor="ctr"/>
+          <a:lstStyle/>
+          <a:p>
+            <a:pPr algn="ctr"/>
+            <a:endParaRPr lang="en-IN"/>
+          </a:p>
+        </p:txBody>
+      </p:sp>
+      <p:sp>
+        <p:nvSpPr>
+          <p:cNvPr id="10" name="Rectangle 9">
+            <a:extLst>
+              <a:ext uri="{FF2B5EF4-FFF2-40B4-BE49-F238E27FC236}">
+                <a16:creationId xmlns:a16="http://schemas.microsoft.com/office/drawing/2014/main" id="{F72C980C-AAFF-8785-541B-6D8EF82CC205}"/>
+              </a:ext>
+            </a:extLst>
+          </p:cNvPr>
+          <p:cNvSpPr/>
+          <p:nvPr/>
+        </p:nvSpPr>
+        <p:spPr>
+          <a:xfrm>
+            <a:off x="4320047" y="2536721"/>
+            <a:ext cx="195413" cy="1101212"/>
+          </a:xfrm>
+          <a:prstGeom prst="rect">
+            <a:avLst/>
+          </a:prstGeom>
+          <a:solidFill>
+            <a:srgbClr val="0070C0"/>
+          </a:solidFill>
+          <a:ln>
+            <a:noFill/>
+          </a:ln>
+        </p:spPr>
+        <p:style>
+          <a:lnRef idx="2">
+            <a:schemeClr val="accent1">
+              <a:shade val="50000"/>
+            </a:schemeClr>
+          </a:lnRef>
+          <a:fillRef idx="1">
+            <a:schemeClr val="accent1"/>
+          </a:fillRef>
+          <a:effectRef idx="0">
+            <a:schemeClr val="accent1"/>
+          </a:effectRef>
+          <a:fontRef idx="minor">
+            <a:schemeClr val="lt1"/>
+          </a:fontRef>
+        </p:style>
+        <p:txBody>
+          <a:bodyPr rtlCol="0" anchor="ctr"/>
+          <a:lstStyle/>
+          <a:p>
+            <a:pPr algn="ctr"/>
+            <a:endParaRPr lang="en-IN"/>
+          </a:p>
+        </p:txBody>
+      </p:sp>
+      <p:pic>
+        <p:nvPicPr>
+          <p:cNvPr id="12" name="Graphic 11" descr="Social network with solid fill">
+            <a:extLst>
+              <a:ext uri="{FF2B5EF4-FFF2-40B4-BE49-F238E27FC236}">
+                <a16:creationId xmlns:a16="http://schemas.microsoft.com/office/drawing/2014/main" id="{8E5B24D0-B653-79D5-E9AB-8DDD17F9DB71}"/>
+              </a:ext>
+            </a:extLst>
+          </p:cNvPr>
+          <p:cNvPicPr>
+            <a:picLocks noChangeAspect="1"/>
+          </p:cNvPicPr>
+          <p:nvPr/>
+        </p:nvPicPr>
+        <p:blipFill>
+          <a:blip r:embed="rId2">
+            <a:extLst>
+              <a:ext uri="{28A0092B-C50C-407E-A947-70E740481C1C}">
+                <a14:useLocalDpi xmlns:a14="http://schemas.microsoft.com/office/drawing/2010/main" val="0"/>
+              </a:ext>
+              <a:ext uri="{96DAC541-7B7A-43D3-8B79-37D633B846F1}">
+                <asvg:svgBlip xmlns:asvg="http://schemas.microsoft.com/office/drawing/2016/SVG/main" r:embed="rId3"/>
+              </a:ext>
+            </a:extLst>
+          </a:blip>
+          <a:stretch>
+            <a:fillRect/>
+          </a:stretch>
+        </p:blipFill>
+        <p:spPr>
+          <a:xfrm>
+            <a:off x="3672346" y="2660853"/>
+            <a:ext cx="845575" cy="845575"/>
+          </a:xfrm>
+          <a:prstGeom prst="rect">
+            <a:avLst/>
+          </a:prstGeom>
+        </p:spPr>
+      </p:pic>
+    </p:spTree>
+    <p:extLst>
+      <p:ext uri="{BB962C8B-B14F-4D97-AF65-F5344CB8AC3E}">
+        <p14:creationId xmlns:p14="http://schemas.microsoft.com/office/powerpoint/2010/main" val="225211963"/>
+      </p:ext>
+    </p:extLst>
+  </p:cSld>
+  <p:clrMapOvr>
+    <a:masterClrMapping/>
+  </p:clrMapOvr>
+</p:sld>
+</file>
+
 <file path=ppt/theme/theme1.xml><?xml version="1.0" encoding="utf-8"?>
 <a:theme xmlns:a="http://schemas.openxmlformats.org/drawingml/2006/main" name="Office Theme">
   <a:themeElements>

</xml_diff>

<commit_message>
Completed Cards For All Pages. Added Summary Page
</commit_message>
<xml_diff>
--- a/Power_BI_Project_Assignments/Icons.pptx
+++ b/Power_BI_Project_Assignments/Icons.pptx
@@ -6,7 +6,6 @@
   </p:sldMasterIdLst>
   <p:sldIdLst>
     <p:sldId id="256" r:id="rId2"/>
-    <p:sldId id="257" r:id="rId3"/>
   </p:sldIdLst>
   <p:sldSz cx="12192000" cy="6858000"/>
   <p:notesSz cx="6858000" cy="9144000"/>
@@ -262,7 +261,7 @@
           <a:p>
             <a:fld id="{28E05424-D9A3-49CC-9B54-DFC4393D1FDE}" type="datetimeFigureOut">
               <a:rPr lang="en-IN" smtClean="0"/>
-              <a:t>02-11-2022</a:t>
+              <a:t>03-11-2022</a:t>
             </a:fld>
             <a:endParaRPr lang="en-IN"/>
           </a:p>
@@ -462,7 +461,7 @@
           <a:p>
             <a:fld id="{28E05424-D9A3-49CC-9B54-DFC4393D1FDE}" type="datetimeFigureOut">
               <a:rPr lang="en-IN" smtClean="0"/>
-              <a:t>02-11-2022</a:t>
+              <a:t>03-11-2022</a:t>
             </a:fld>
             <a:endParaRPr lang="en-IN"/>
           </a:p>
@@ -672,7 +671,7 @@
           <a:p>
             <a:fld id="{28E05424-D9A3-49CC-9B54-DFC4393D1FDE}" type="datetimeFigureOut">
               <a:rPr lang="en-IN" smtClean="0"/>
-              <a:t>02-11-2022</a:t>
+              <a:t>03-11-2022</a:t>
             </a:fld>
             <a:endParaRPr lang="en-IN"/>
           </a:p>
@@ -872,7 +871,7 @@
           <a:p>
             <a:fld id="{28E05424-D9A3-49CC-9B54-DFC4393D1FDE}" type="datetimeFigureOut">
               <a:rPr lang="en-IN" smtClean="0"/>
-              <a:t>02-11-2022</a:t>
+              <a:t>03-11-2022</a:t>
             </a:fld>
             <a:endParaRPr lang="en-IN"/>
           </a:p>
@@ -1148,7 +1147,7 @@
           <a:p>
             <a:fld id="{28E05424-D9A3-49CC-9B54-DFC4393D1FDE}" type="datetimeFigureOut">
               <a:rPr lang="en-IN" smtClean="0"/>
-              <a:t>02-11-2022</a:t>
+              <a:t>03-11-2022</a:t>
             </a:fld>
             <a:endParaRPr lang="en-IN"/>
           </a:p>
@@ -1416,7 +1415,7 @@
           <a:p>
             <a:fld id="{28E05424-D9A3-49CC-9B54-DFC4393D1FDE}" type="datetimeFigureOut">
               <a:rPr lang="en-IN" smtClean="0"/>
-              <a:t>02-11-2022</a:t>
+              <a:t>03-11-2022</a:t>
             </a:fld>
             <a:endParaRPr lang="en-IN"/>
           </a:p>
@@ -1831,7 +1830,7 @@
           <a:p>
             <a:fld id="{28E05424-D9A3-49CC-9B54-DFC4393D1FDE}" type="datetimeFigureOut">
               <a:rPr lang="en-IN" smtClean="0"/>
-              <a:t>02-11-2022</a:t>
+              <a:t>03-11-2022</a:t>
             </a:fld>
             <a:endParaRPr lang="en-IN"/>
           </a:p>
@@ -1973,7 +1972,7 @@
           <a:p>
             <a:fld id="{28E05424-D9A3-49CC-9B54-DFC4393D1FDE}" type="datetimeFigureOut">
               <a:rPr lang="en-IN" smtClean="0"/>
-              <a:t>02-11-2022</a:t>
+              <a:t>03-11-2022</a:t>
             </a:fld>
             <a:endParaRPr lang="en-IN"/>
           </a:p>
@@ -2086,7 +2085,7 @@
           <a:p>
             <a:fld id="{28E05424-D9A3-49CC-9B54-DFC4393D1FDE}" type="datetimeFigureOut">
               <a:rPr lang="en-IN" smtClean="0"/>
-              <a:t>02-11-2022</a:t>
+              <a:t>03-11-2022</a:t>
             </a:fld>
             <a:endParaRPr lang="en-IN"/>
           </a:p>
@@ -2399,7 +2398,7 @@
           <a:p>
             <a:fld id="{28E05424-D9A3-49CC-9B54-DFC4393D1FDE}" type="datetimeFigureOut">
               <a:rPr lang="en-IN" smtClean="0"/>
-              <a:t>02-11-2022</a:t>
+              <a:t>03-11-2022</a:t>
             </a:fld>
             <a:endParaRPr lang="en-IN"/>
           </a:p>
@@ -2688,7 +2687,7 @@
           <a:p>
             <a:fld id="{28E05424-D9A3-49CC-9B54-DFC4393D1FDE}" type="datetimeFigureOut">
               <a:rPr lang="en-IN" smtClean="0"/>
-              <a:t>02-11-2022</a:t>
+              <a:t>03-11-2022</a:t>
             </a:fld>
             <a:endParaRPr lang="en-IN"/>
           </a:p>
@@ -2931,7 +2930,7 @@
           <a:p>
             <a:fld id="{28E05424-D9A3-49CC-9B54-DFC4393D1FDE}" type="datetimeFigureOut">
               <a:rPr lang="en-IN" smtClean="0"/>
-              <a:t>02-11-2022</a:t>
+              <a:t>03-11-2022</a:t>
             </a:fld>
             <a:endParaRPr lang="en-IN"/>
           </a:p>
@@ -3334,6 +3333,14 @@
 <file path=ppt/slides/slide1.xml><?xml version="1.0" encoding="utf-8"?>
 <p:sld xmlns:a="http://schemas.openxmlformats.org/drawingml/2006/main" xmlns:r="http://schemas.openxmlformats.org/officeDocument/2006/relationships" xmlns:p="http://schemas.openxmlformats.org/presentationml/2006/main">
   <p:cSld>
+    <p:bg>
+      <p:bgPr>
+        <a:solidFill>
+          <a:schemeClr val="bg1"/>
+        </a:solidFill>
+        <a:effectLst/>
+      </p:bgPr>
+    </p:bg>
     <p:spTree>
       <p:nvGrpSpPr>
         <p:cNvPr id="1" name=""/>
@@ -3379,7 +3386,7 @@
         </p:blipFill>
         <p:spPr>
           <a:xfrm>
-            <a:off x="5638800" y="2971800"/>
+            <a:off x="330917" y="1565787"/>
             <a:ext cx="914400" cy="914400"/>
           </a:xfrm>
           <a:prstGeom prst="rect">
@@ -3418,8 +3425,8 @@
         </p:blipFill>
         <p:spPr>
           <a:xfrm>
-            <a:off x="1104286" y="1388807"/>
-            <a:ext cx="2533650" cy="2895600"/>
+            <a:off x="170222" y="0"/>
+            <a:ext cx="1235791" cy="1412333"/>
           </a:xfrm>
           <a:prstGeom prst="rect">
             <a:avLst/>
@@ -3457,243 +3464,1530 @@
         </p:blipFill>
         <p:spPr>
           <a:xfrm>
-            <a:off x="4524989" y="623426"/>
-            <a:ext cx="6562725" cy="5276850"/>
+            <a:off x="150558" y="2833472"/>
+            <a:ext cx="3841340" cy="3088683"/>
           </a:xfrm>
           <a:prstGeom prst="rect">
             <a:avLst/>
           </a:prstGeom>
         </p:spPr>
       </p:pic>
+      <p:grpSp>
+        <p:nvGrpSpPr>
+          <p:cNvPr id="2" name="Group 1">
+            <a:extLst>
+              <a:ext uri="{FF2B5EF4-FFF2-40B4-BE49-F238E27FC236}">
+                <a16:creationId xmlns:a16="http://schemas.microsoft.com/office/drawing/2014/main" id="{9A161948-2A18-826A-E947-A3C5FFFFBD64}"/>
+              </a:ext>
+            </a:extLst>
+          </p:cNvPr>
+          <p:cNvGrpSpPr/>
+          <p:nvPr/>
+        </p:nvGrpSpPr>
+        <p:grpSpPr>
+          <a:xfrm>
+            <a:off x="4567085" y="177438"/>
+            <a:ext cx="3057830" cy="1101215"/>
+            <a:chOff x="307253" y="197102"/>
+            <a:chExt cx="3057830" cy="1101215"/>
+          </a:xfrm>
+        </p:grpSpPr>
+        <p:sp>
+          <p:nvSpPr>
+            <p:cNvPr id="3" name="Rectangle: Rounded Corners 2">
+              <a:extLst>
+                <a:ext uri="{FF2B5EF4-FFF2-40B4-BE49-F238E27FC236}">
+                  <a16:creationId xmlns:a16="http://schemas.microsoft.com/office/drawing/2014/main" id="{B79D2B42-382C-543F-E8E5-6C2BF62EAF10}"/>
+                </a:ext>
+              </a:extLst>
+            </p:cNvPr>
+            <p:cNvSpPr/>
+            <p:nvPr/>
+          </p:nvSpPr>
+          <p:spPr>
+            <a:xfrm>
+              <a:off x="1048356" y="197102"/>
+              <a:ext cx="2316727" cy="1093843"/>
+            </a:xfrm>
+            <a:prstGeom prst="roundRect">
+              <a:avLst/>
+            </a:prstGeom>
+            <a:solidFill>
+              <a:schemeClr val="bg1"/>
+            </a:solidFill>
+            <a:ln>
+              <a:noFill/>
+            </a:ln>
+          </p:spPr>
+          <p:style>
+            <a:lnRef idx="2">
+              <a:schemeClr val="accent1">
+                <a:shade val="50000"/>
+              </a:schemeClr>
+            </a:lnRef>
+            <a:fillRef idx="1">
+              <a:schemeClr val="accent1"/>
+            </a:fillRef>
+            <a:effectRef idx="0">
+              <a:schemeClr val="accent1"/>
+            </a:effectRef>
+            <a:fontRef idx="minor">
+              <a:schemeClr val="lt1"/>
+            </a:fontRef>
+          </p:style>
+          <p:txBody>
+            <a:bodyPr rtlCol="0" anchor="ctr"/>
+            <a:lstStyle/>
+            <a:p>
+              <a:pPr algn="ctr"/>
+              <a:endParaRPr lang="en-IN"/>
+            </a:p>
+          </p:txBody>
+        </p:sp>
+        <p:sp>
+          <p:nvSpPr>
+            <p:cNvPr id="4" name="Rectangle: Rounded Corners 3">
+              <a:extLst>
+                <a:ext uri="{FF2B5EF4-FFF2-40B4-BE49-F238E27FC236}">
+                  <a16:creationId xmlns:a16="http://schemas.microsoft.com/office/drawing/2014/main" id="{96BB978F-F0D9-5411-1044-5CFA5C821760}"/>
+                </a:ext>
+              </a:extLst>
+            </p:cNvPr>
+            <p:cNvSpPr/>
+            <p:nvPr/>
+          </p:nvSpPr>
+          <p:spPr>
+            <a:xfrm>
+              <a:off x="307253" y="197105"/>
+              <a:ext cx="843114" cy="1101212"/>
+            </a:xfrm>
+            <a:prstGeom prst="roundRect">
+              <a:avLst/>
+            </a:prstGeom>
+            <a:solidFill>
+              <a:srgbClr val="0070C0"/>
+            </a:solidFill>
+            <a:ln>
+              <a:noFill/>
+            </a:ln>
+          </p:spPr>
+          <p:style>
+            <a:lnRef idx="2">
+              <a:schemeClr val="accent1">
+                <a:shade val="50000"/>
+              </a:schemeClr>
+            </a:lnRef>
+            <a:fillRef idx="1">
+              <a:schemeClr val="accent1"/>
+            </a:fillRef>
+            <a:effectRef idx="0">
+              <a:schemeClr val="accent1"/>
+            </a:effectRef>
+            <a:fontRef idx="minor">
+              <a:schemeClr val="lt1"/>
+            </a:fontRef>
+          </p:style>
+          <p:txBody>
+            <a:bodyPr rtlCol="0" anchor="ctr"/>
+            <a:lstStyle/>
+            <a:p>
+              <a:pPr algn="ctr"/>
+              <a:endParaRPr lang="en-IN" dirty="0"/>
+            </a:p>
+          </p:txBody>
+        </p:sp>
+        <p:sp>
+          <p:nvSpPr>
+            <p:cNvPr id="6" name="Rectangle 5">
+              <a:extLst>
+                <a:ext uri="{FF2B5EF4-FFF2-40B4-BE49-F238E27FC236}">
+                  <a16:creationId xmlns:a16="http://schemas.microsoft.com/office/drawing/2014/main" id="{06A69D63-8193-BEE5-D210-D284812456D6}"/>
+                </a:ext>
+              </a:extLst>
+            </p:cNvPr>
+            <p:cNvSpPr/>
+            <p:nvPr/>
+          </p:nvSpPr>
+          <p:spPr>
+            <a:xfrm>
+              <a:off x="1048357" y="197103"/>
+              <a:ext cx="195413" cy="1101212"/>
+            </a:xfrm>
+            <a:prstGeom prst="rect">
+              <a:avLst/>
+            </a:prstGeom>
+            <a:solidFill>
+              <a:srgbClr val="0070C0"/>
+            </a:solidFill>
+            <a:ln>
+              <a:noFill/>
+            </a:ln>
+          </p:spPr>
+          <p:style>
+            <a:lnRef idx="2">
+              <a:schemeClr val="accent1">
+                <a:shade val="50000"/>
+              </a:schemeClr>
+            </a:lnRef>
+            <a:fillRef idx="1">
+              <a:schemeClr val="accent1"/>
+            </a:fillRef>
+            <a:effectRef idx="0">
+              <a:schemeClr val="accent1"/>
+            </a:effectRef>
+            <a:fontRef idx="minor">
+              <a:schemeClr val="lt1"/>
+            </a:fontRef>
+          </p:style>
+          <p:txBody>
+            <a:bodyPr rtlCol="0" anchor="ctr"/>
+            <a:lstStyle/>
+            <a:p>
+              <a:pPr algn="ctr"/>
+              <a:endParaRPr lang="en-IN"/>
+            </a:p>
+          </p:txBody>
+        </p:sp>
+        <p:pic>
+          <p:nvPicPr>
+            <p:cNvPr id="8" name="Graphic 7" descr="Social network with solid fill">
+              <a:extLst>
+                <a:ext uri="{FF2B5EF4-FFF2-40B4-BE49-F238E27FC236}">
+                  <a16:creationId xmlns:a16="http://schemas.microsoft.com/office/drawing/2014/main" id="{A1C52531-4795-B527-81E5-CEC885A52BB8}"/>
+                </a:ext>
+              </a:extLst>
+            </p:cNvPr>
+            <p:cNvPicPr>
+              <a:picLocks noChangeAspect="1"/>
+            </p:cNvPicPr>
+            <p:nvPr/>
+          </p:nvPicPr>
+          <p:blipFill>
+            <a:blip r:embed="rId8">
+              <a:extLst>
+                <a:ext uri="{28A0092B-C50C-407E-A947-70E740481C1C}">
+                  <a14:useLocalDpi xmlns:a14="http://schemas.microsoft.com/office/drawing/2010/main" val="0"/>
+                </a:ext>
+                <a:ext uri="{96DAC541-7B7A-43D3-8B79-37D633B846F1}">
+                  <asvg:svgBlip xmlns:asvg="http://schemas.microsoft.com/office/drawing/2016/SVG/main" r:embed="rId9"/>
+                </a:ext>
+              </a:extLst>
+            </a:blip>
+            <a:stretch>
+              <a:fillRect/>
+            </a:stretch>
+          </p:blipFill>
+          <p:spPr>
+            <a:xfrm>
+              <a:off x="400656" y="321235"/>
+              <a:ext cx="845575" cy="845575"/>
+            </a:xfrm>
+            <a:prstGeom prst="rect">
+              <a:avLst/>
+            </a:prstGeom>
+          </p:spPr>
+        </p:pic>
+      </p:grpSp>
+      <p:grpSp>
+        <p:nvGrpSpPr>
+          <p:cNvPr id="10" name="Group 9">
+            <a:extLst>
+              <a:ext uri="{FF2B5EF4-FFF2-40B4-BE49-F238E27FC236}">
+                <a16:creationId xmlns:a16="http://schemas.microsoft.com/office/drawing/2014/main" id="{88A5B0F4-D54B-46A4-5320-731489FAD724}"/>
+              </a:ext>
+            </a:extLst>
+          </p:cNvPr>
+          <p:cNvGrpSpPr/>
+          <p:nvPr/>
+        </p:nvGrpSpPr>
+        <p:grpSpPr>
+          <a:xfrm>
+            <a:off x="4544968" y="1525843"/>
+            <a:ext cx="3057830" cy="1101215"/>
+            <a:chOff x="285136" y="1516010"/>
+            <a:chExt cx="3057830" cy="1101215"/>
+          </a:xfrm>
+        </p:grpSpPr>
+        <p:sp>
+          <p:nvSpPr>
+            <p:cNvPr id="11" name="Rectangle: Rounded Corners 10">
+              <a:extLst>
+                <a:ext uri="{FF2B5EF4-FFF2-40B4-BE49-F238E27FC236}">
+                  <a16:creationId xmlns:a16="http://schemas.microsoft.com/office/drawing/2014/main" id="{32D256EA-62F3-1F2C-6E88-BB4E2971D677}"/>
+                </a:ext>
+              </a:extLst>
+            </p:cNvPr>
+            <p:cNvSpPr/>
+            <p:nvPr/>
+          </p:nvSpPr>
+          <p:spPr>
+            <a:xfrm>
+              <a:off x="1026239" y="1516010"/>
+              <a:ext cx="2316727" cy="1093843"/>
+            </a:xfrm>
+            <a:prstGeom prst="roundRect">
+              <a:avLst/>
+            </a:prstGeom>
+            <a:solidFill>
+              <a:schemeClr val="bg1"/>
+            </a:solidFill>
+            <a:ln>
+              <a:noFill/>
+            </a:ln>
+          </p:spPr>
+          <p:style>
+            <a:lnRef idx="2">
+              <a:schemeClr val="accent1">
+                <a:shade val="50000"/>
+              </a:schemeClr>
+            </a:lnRef>
+            <a:fillRef idx="1">
+              <a:schemeClr val="accent1"/>
+            </a:fillRef>
+            <a:effectRef idx="0">
+              <a:schemeClr val="accent1"/>
+            </a:effectRef>
+            <a:fontRef idx="minor">
+              <a:schemeClr val="lt1"/>
+            </a:fontRef>
+          </p:style>
+          <p:txBody>
+            <a:bodyPr rtlCol="0" anchor="ctr"/>
+            <a:lstStyle/>
+            <a:p>
+              <a:pPr algn="ctr"/>
+              <a:endParaRPr lang="en-IN"/>
+            </a:p>
+          </p:txBody>
+        </p:sp>
+        <p:sp>
+          <p:nvSpPr>
+            <p:cNvPr id="12" name="Rectangle: Rounded Corners 11">
+              <a:extLst>
+                <a:ext uri="{FF2B5EF4-FFF2-40B4-BE49-F238E27FC236}">
+                  <a16:creationId xmlns:a16="http://schemas.microsoft.com/office/drawing/2014/main" id="{6744FF96-9FEB-419A-79C2-312F7D79E19E}"/>
+                </a:ext>
+              </a:extLst>
+            </p:cNvPr>
+            <p:cNvSpPr/>
+            <p:nvPr/>
+          </p:nvSpPr>
+          <p:spPr>
+            <a:xfrm>
+              <a:off x="285136" y="1516013"/>
+              <a:ext cx="843114" cy="1101212"/>
+            </a:xfrm>
+            <a:prstGeom prst="roundRect">
+              <a:avLst/>
+            </a:prstGeom>
+            <a:solidFill>
+              <a:srgbClr val="0070C0"/>
+            </a:solidFill>
+            <a:ln>
+              <a:noFill/>
+            </a:ln>
+          </p:spPr>
+          <p:style>
+            <a:lnRef idx="2">
+              <a:schemeClr val="accent1">
+                <a:shade val="50000"/>
+              </a:schemeClr>
+            </a:lnRef>
+            <a:fillRef idx="1">
+              <a:schemeClr val="accent1"/>
+            </a:fillRef>
+            <a:effectRef idx="0">
+              <a:schemeClr val="accent1"/>
+            </a:effectRef>
+            <a:fontRef idx="minor">
+              <a:schemeClr val="lt1"/>
+            </a:fontRef>
+          </p:style>
+          <p:txBody>
+            <a:bodyPr rtlCol="0" anchor="ctr"/>
+            <a:lstStyle/>
+            <a:p>
+              <a:pPr algn="ctr"/>
+              <a:endParaRPr lang="en-IN" dirty="0"/>
+            </a:p>
+          </p:txBody>
+        </p:sp>
+        <p:sp>
+          <p:nvSpPr>
+            <p:cNvPr id="13" name="Rectangle 12">
+              <a:extLst>
+                <a:ext uri="{FF2B5EF4-FFF2-40B4-BE49-F238E27FC236}">
+                  <a16:creationId xmlns:a16="http://schemas.microsoft.com/office/drawing/2014/main" id="{CBB0FC62-B387-10C4-D50E-DFBB9023383E}"/>
+                </a:ext>
+              </a:extLst>
+            </p:cNvPr>
+            <p:cNvSpPr/>
+            <p:nvPr/>
+          </p:nvSpPr>
+          <p:spPr>
+            <a:xfrm>
+              <a:off x="1026240" y="1516011"/>
+              <a:ext cx="195413" cy="1101212"/>
+            </a:xfrm>
+            <a:prstGeom prst="rect">
+              <a:avLst/>
+            </a:prstGeom>
+            <a:solidFill>
+              <a:srgbClr val="0070C0"/>
+            </a:solidFill>
+            <a:ln>
+              <a:noFill/>
+            </a:ln>
+          </p:spPr>
+          <p:style>
+            <a:lnRef idx="2">
+              <a:schemeClr val="accent1">
+                <a:shade val="50000"/>
+              </a:schemeClr>
+            </a:lnRef>
+            <a:fillRef idx="1">
+              <a:schemeClr val="accent1"/>
+            </a:fillRef>
+            <a:effectRef idx="0">
+              <a:schemeClr val="accent1"/>
+            </a:effectRef>
+            <a:fontRef idx="minor">
+              <a:schemeClr val="lt1"/>
+            </a:fontRef>
+          </p:style>
+          <p:txBody>
+            <a:bodyPr rtlCol="0" anchor="ctr"/>
+            <a:lstStyle/>
+            <a:p>
+              <a:pPr algn="ctr"/>
+              <a:endParaRPr lang="en-IN"/>
+            </a:p>
+          </p:txBody>
+        </p:sp>
+        <p:pic>
+          <p:nvPicPr>
+            <p:cNvPr id="14" name="Graphic 13" descr="Graduation cap with solid fill">
+              <a:extLst>
+                <a:ext uri="{FF2B5EF4-FFF2-40B4-BE49-F238E27FC236}">
+                  <a16:creationId xmlns:a16="http://schemas.microsoft.com/office/drawing/2014/main" id="{9CC8F12D-D792-75C2-F97B-229D5354BF10}"/>
+                </a:ext>
+              </a:extLst>
+            </p:cNvPr>
+            <p:cNvPicPr>
+              <a:picLocks noChangeAspect="1"/>
+            </p:cNvPicPr>
+            <p:nvPr/>
+          </p:nvPicPr>
+          <p:blipFill>
+            <a:blip r:embed="rId10">
+              <a:extLst>
+                <a:ext uri="{28A0092B-C50C-407E-A947-70E740481C1C}">
+                  <a14:useLocalDpi xmlns:a14="http://schemas.microsoft.com/office/drawing/2010/main" val="0"/>
+                </a:ext>
+                <a:ext uri="{96DAC541-7B7A-43D3-8B79-37D633B846F1}">
+                  <asvg:svgBlip xmlns:asvg="http://schemas.microsoft.com/office/drawing/2016/SVG/main" r:embed="rId11"/>
+                </a:ext>
+              </a:extLst>
+            </a:blip>
+            <a:stretch>
+              <a:fillRect/>
+            </a:stretch>
+          </p:blipFill>
+          <p:spPr>
+            <a:xfrm>
+              <a:off x="307253" y="1605731"/>
+              <a:ext cx="914400" cy="914400"/>
+            </a:xfrm>
+            <a:prstGeom prst="rect">
+              <a:avLst/>
+            </a:prstGeom>
+          </p:spPr>
+        </p:pic>
+      </p:grpSp>
+      <p:grpSp>
+        <p:nvGrpSpPr>
+          <p:cNvPr id="15" name="Group 14">
+            <a:extLst>
+              <a:ext uri="{FF2B5EF4-FFF2-40B4-BE49-F238E27FC236}">
+                <a16:creationId xmlns:a16="http://schemas.microsoft.com/office/drawing/2014/main" id="{7DE1A0FE-99A0-8106-8035-3F000F8500EB}"/>
+              </a:ext>
+            </a:extLst>
+          </p:cNvPr>
+          <p:cNvGrpSpPr/>
+          <p:nvPr/>
+        </p:nvGrpSpPr>
+        <p:grpSpPr>
+          <a:xfrm>
+            <a:off x="4544968" y="2743812"/>
+            <a:ext cx="3057830" cy="1101215"/>
+            <a:chOff x="285136" y="2763476"/>
+            <a:chExt cx="3057830" cy="1101215"/>
+          </a:xfrm>
+        </p:grpSpPr>
+        <p:sp>
+          <p:nvSpPr>
+            <p:cNvPr id="16" name="Rectangle: Rounded Corners 15">
+              <a:extLst>
+                <a:ext uri="{FF2B5EF4-FFF2-40B4-BE49-F238E27FC236}">
+                  <a16:creationId xmlns:a16="http://schemas.microsoft.com/office/drawing/2014/main" id="{D98F6FE5-4E39-C99E-FAAC-F083C97AB93B}"/>
+                </a:ext>
+              </a:extLst>
+            </p:cNvPr>
+            <p:cNvSpPr/>
+            <p:nvPr/>
+          </p:nvSpPr>
+          <p:spPr>
+            <a:xfrm>
+              <a:off x="1026239" y="2763476"/>
+              <a:ext cx="2316727" cy="1093843"/>
+            </a:xfrm>
+            <a:prstGeom prst="roundRect">
+              <a:avLst/>
+            </a:prstGeom>
+            <a:solidFill>
+              <a:schemeClr val="bg1"/>
+            </a:solidFill>
+            <a:ln>
+              <a:noFill/>
+            </a:ln>
+          </p:spPr>
+          <p:style>
+            <a:lnRef idx="2">
+              <a:schemeClr val="accent1">
+                <a:shade val="50000"/>
+              </a:schemeClr>
+            </a:lnRef>
+            <a:fillRef idx="1">
+              <a:schemeClr val="accent1"/>
+            </a:fillRef>
+            <a:effectRef idx="0">
+              <a:schemeClr val="accent1"/>
+            </a:effectRef>
+            <a:fontRef idx="minor">
+              <a:schemeClr val="lt1"/>
+            </a:fontRef>
+          </p:style>
+          <p:txBody>
+            <a:bodyPr rtlCol="0" anchor="ctr"/>
+            <a:lstStyle/>
+            <a:p>
+              <a:pPr algn="ctr"/>
+              <a:endParaRPr lang="en-IN"/>
+            </a:p>
+          </p:txBody>
+        </p:sp>
+        <p:sp>
+          <p:nvSpPr>
+            <p:cNvPr id="17" name="Rectangle: Rounded Corners 16">
+              <a:extLst>
+                <a:ext uri="{FF2B5EF4-FFF2-40B4-BE49-F238E27FC236}">
+                  <a16:creationId xmlns:a16="http://schemas.microsoft.com/office/drawing/2014/main" id="{D16A428E-C21C-0EC2-B2FA-7D080D375F66}"/>
+                </a:ext>
+              </a:extLst>
+            </p:cNvPr>
+            <p:cNvSpPr/>
+            <p:nvPr/>
+          </p:nvSpPr>
+          <p:spPr>
+            <a:xfrm>
+              <a:off x="285136" y="2763479"/>
+              <a:ext cx="843114" cy="1101212"/>
+            </a:xfrm>
+            <a:prstGeom prst="roundRect">
+              <a:avLst/>
+            </a:prstGeom>
+            <a:solidFill>
+              <a:srgbClr val="0070C0"/>
+            </a:solidFill>
+            <a:ln>
+              <a:noFill/>
+            </a:ln>
+          </p:spPr>
+          <p:style>
+            <a:lnRef idx="2">
+              <a:schemeClr val="accent1">
+                <a:shade val="50000"/>
+              </a:schemeClr>
+            </a:lnRef>
+            <a:fillRef idx="1">
+              <a:schemeClr val="accent1"/>
+            </a:fillRef>
+            <a:effectRef idx="0">
+              <a:schemeClr val="accent1"/>
+            </a:effectRef>
+            <a:fontRef idx="minor">
+              <a:schemeClr val="lt1"/>
+            </a:fontRef>
+          </p:style>
+          <p:txBody>
+            <a:bodyPr rtlCol="0" anchor="ctr"/>
+            <a:lstStyle/>
+            <a:p>
+              <a:pPr algn="ctr"/>
+              <a:endParaRPr lang="en-IN" dirty="0"/>
+            </a:p>
+          </p:txBody>
+        </p:sp>
+        <p:sp>
+          <p:nvSpPr>
+            <p:cNvPr id="18" name="Rectangle 17">
+              <a:extLst>
+                <a:ext uri="{FF2B5EF4-FFF2-40B4-BE49-F238E27FC236}">
+                  <a16:creationId xmlns:a16="http://schemas.microsoft.com/office/drawing/2014/main" id="{6D356063-3BE0-B927-5E5D-4458C8750670}"/>
+                </a:ext>
+              </a:extLst>
+            </p:cNvPr>
+            <p:cNvSpPr/>
+            <p:nvPr/>
+          </p:nvSpPr>
+          <p:spPr>
+            <a:xfrm>
+              <a:off x="1026240" y="2763479"/>
+              <a:ext cx="195413" cy="1101212"/>
+            </a:xfrm>
+            <a:prstGeom prst="rect">
+              <a:avLst/>
+            </a:prstGeom>
+            <a:solidFill>
+              <a:srgbClr val="0070C0"/>
+            </a:solidFill>
+            <a:ln>
+              <a:noFill/>
+            </a:ln>
+          </p:spPr>
+          <p:style>
+            <a:lnRef idx="2">
+              <a:schemeClr val="accent1">
+                <a:shade val="50000"/>
+              </a:schemeClr>
+            </a:lnRef>
+            <a:fillRef idx="1">
+              <a:schemeClr val="accent1"/>
+            </a:fillRef>
+            <a:effectRef idx="0">
+              <a:schemeClr val="accent1"/>
+            </a:effectRef>
+            <a:fontRef idx="minor">
+              <a:schemeClr val="lt1"/>
+            </a:fontRef>
+          </p:style>
+          <p:txBody>
+            <a:bodyPr rtlCol="0" anchor="ctr"/>
+            <a:lstStyle/>
+            <a:p>
+              <a:pPr algn="ctr"/>
+              <a:endParaRPr lang="en-IN"/>
+            </a:p>
+          </p:txBody>
+        </p:sp>
+        <p:pic>
+          <p:nvPicPr>
+            <p:cNvPr id="19" name="Graphic 18" descr="Briefcase with solid fill">
+              <a:extLst>
+                <a:ext uri="{FF2B5EF4-FFF2-40B4-BE49-F238E27FC236}">
+                  <a16:creationId xmlns:a16="http://schemas.microsoft.com/office/drawing/2014/main" id="{EA9D07AA-F9E9-4AE3-0523-647D1BB7C882}"/>
+                </a:ext>
+              </a:extLst>
+            </p:cNvPr>
+            <p:cNvPicPr>
+              <a:picLocks noChangeAspect="1"/>
+            </p:cNvPicPr>
+            <p:nvPr/>
+          </p:nvPicPr>
+          <p:blipFill>
+            <a:blip r:embed="rId12">
+              <a:extLst>
+                <a:ext uri="{28A0092B-C50C-407E-A947-70E740481C1C}">
+                  <a14:useLocalDpi xmlns:a14="http://schemas.microsoft.com/office/drawing/2010/main" val="0"/>
+                </a:ext>
+                <a:ext uri="{96DAC541-7B7A-43D3-8B79-37D633B846F1}">
+                  <asvg:svgBlip xmlns:asvg="http://schemas.microsoft.com/office/drawing/2016/SVG/main" r:embed="rId13"/>
+                </a:ext>
+              </a:extLst>
+            </a:blip>
+            <a:stretch>
+              <a:fillRect/>
+            </a:stretch>
+          </p:blipFill>
+          <p:spPr>
+            <a:xfrm>
+              <a:off x="364709" y="2930778"/>
+              <a:ext cx="759237" cy="759237"/>
+            </a:xfrm>
+            <a:prstGeom prst="rect">
+              <a:avLst/>
+            </a:prstGeom>
+          </p:spPr>
+        </p:pic>
+      </p:grpSp>
+      <p:grpSp>
+        <p:nvGrpSpPr>
+          <p:cNvPr id="20" name="Group 19">
+            <a:extLst>
+              <a:ext uri="{FF2B5EF4-FFF2-40B4-BE49-F238E27FC236}">
+                <a16:creationId xmlns:a16="http://schemas.microsoft.com/office/drawing/2014/main" id="{1B4499DC-9059-9D83-F1B4-4E183A99188F}"/>
+              </a:ext>
+            </a:extLst>
+          </p:cNvPr>
+          <p:cNvGrpSpPr/>
+          <p:nvPr/>
+        </p:nvGrpSpPr>
+        <p:grpSpPr>
+          <a:xfrm>
+            <a:off x="4519764" y="3983906"/>
+            <a:ext cx="3057830" cy="1101215"/>
+            <a:chOff x="259932" y="4003570"/>
+            <a:chExt cx="3057830" cy="1101215"/>
+          </a:xfrm>
+        </p:grpSpPr>
+        <p:sp>
+          <p:nvSpPr>
+            <p:cNvPr id="21" name="Rectangle: Rounded Corners 20">
+              <a:extLst>
+                <a:ext uri="{FF2B5EF4-FFF2-40B4-BE49-F238E27FC236}">
+                  <a16:creationId xmlns:a16="http://schemas.microsoft.com/office/drawing/2014/main" id="{DB4BC61A-5A30-A785-3177-CE243ACC021D}"/>
+                </a:ext>
+              </a:extLst>
+            </p:cNvPr>
+            <p:cNvSpPr/>
+            <p:nvPr/>
+          </p:nvSpPr>
+          <p:spPr>
+            <a:xfrm>
+              <a:off x="1001035" y="4003570"/>
+              <a:ext cx="2316727" cy="1093843"/>
+            </a:xfrm>
+            <a:prstGeom prst="roundRect">
+              <a:avLst/>
+            </a:prstGeom>
+            <a:solidFill>
+              <a:schemeClr val="bg1"/>
+            </a:solidFill>
+            <a:ln>
+              <a:noFill/>
+            </a:ln>
+          </p:spPr>
+          <p:style>
+            <a:lnRef idx="2">
+              <a:schemeClr val="accent1">
+                <a:shade val="50000"/>
+              </a:schemeClr>
+            </a:lnRef>
+            <a:fillRef idx="1">
+              <a:schemeClr val="accent1"/>
+            </a:fillRef>
+            <a:effectRef idx="0">
+              <a:schemeClr val="accent1"/>
+            </a:effectRef>
+            <a:fontRef idx="minor">
+              <a:schemeClr val="lt1"/>
+            </a:fontRef>
+          </p:style>
+          <p:txBody>
+            <a:bodyPr rtlCol="0" anchor="ctr"/>
+            <a:lstStyle/>
+            <a:p>
+              <a:pPr algn="ctr"/>
+              <a:endParaRPr lang="en-IN"/>
+            </a:p>
+          </p:txBody>
+        </p:sp>
+        <p:sp>
+          <p:nvSpPr>
+            <p:cNvPr id="22" name="Rectangle: Rounded Corners 21">
+              <a:extLst>
+                <a:ext uri="{FF2B5EF4-FFF2-40B4-BE49-F238E27FC236}">
+                  <a16:creationId xmlns:a16="http://schemas.microsoft.com/office/drawing/2014/main" id="{A8899067-18EB-A902-EF16-BD72D7FB49DA}"/>
+                </a:ext>
+              </a:extLst>
+            </p:cNvPr>
+            <p:cNvSpPr/>
+            <p:nvPr/>
+          </p:nvSpPr>
+          <p:spPr>
+            <a:xfrm>
+              <a:off x="259932" y="4003573"/>
+              <a:ext cx="843114" cy="1101212"/>
+            </a:xfrm>
+            <a:prstGeom prst="roundRect">
+              <a:avLst/>
+            </a:prstGeom>
+            <a:solidFill>
+              <a:srgbClr val="0070C0"/>
+            </a:solidFill>
+            <a:ln>
+              <a:noFill/>
+            </a:ln>
+          </p:spPr>
+          <p:style>
+            <a:lnRef idx="2">
+              <a:schemeClr val="accent1">
+                <a:shade val="50000"/>
+              </a:schemeClr>
+            </a:lnRef>
+            <a:fillRef idx="1">
+              <a:schemeClr val="accent1"/>
+            </a:fillRef>
+            <a:effectRef idx="0">
+              <a:schemeClr val="accent1"/>
+            </a:effectRef>
+            <a:fontRef idx="minor">
+              <a:schemeClr val="lt1"/>
+            </a:fontRef>
+          </p:style>
+          <p:txBody>
+            <a:bodyPr rtlCol="0" anchor="ctr"/>
+            <a:lstStyle/>
+            <a:p>
+              <a:pPr algn="ctr"/>
+              <a:endParaRPr lang="en-IN" dirty="0"/>
+            </a:p>
+          </p:txBody>
+        </p:sp>
+        <p:sp>
+          <p:nvSpPr>
+            <p:cNvPr id="23" name="Rectangle 22">
+              <a:extLst>
+                <a:ext uri="{FF2B5EF4-FFF2-40B4-BE49-F238E27FC236}">
+                  <a16:creationId xmlns:a16="http://schemas.microsoft.com/office/drawing/2014/main" id="{5111E571-7C2D-444C-5F5E-CF3DA88FB962}"/>
+                </a:ext>
+              </a:extLst>
+            </p:cNvPr>
+            <p:cNvSpPr/>
+            <p:nvPr/>
+          </p:nvSpPr>
+          <p:spPr>
+            <a:xfrm>
+              <a:off x="1001036" y="4003573"/>
+              <a:ext cx="195413" cy="1101212"/>
+            </a:xfrm>
+            <a:prstGeom prst="rect">
+              <a:avLst/>
+            </a:prstGeom>
+            <a:solidFill>
+              <a:srgbClr val="0070C0"/>
+            </a:solidFill>
+            <a:ln>
+              <a:noFill/>
+            </a:ln>
+          </p:spPr>
+          <p:style>
+            <a:lnRef idx="2">
+              <a:schemeClr val="accent1">
+                <a:shade val="50000"/>
+              </a:schemeClr>
+            </a:lnRef>
+            <a:fillRef idx="1">
+              <a:schemeClr val="accent1"/>
+            </a:fillRef>
+            <a:effectRef idx="0">
+              <a:schemeClr val="accent1"/>
+            </a:effectRef>
+            <a:fontRef idx="minor">
+              <a:schemeClr val="lt1"/>
+            </a:fontRef>
+          </p:style>
+          <p:txBody>
+            <a:bodyPr rtlCol="0" anchor="ctr"/>
+            <a:lstStyle/>
+            <a:p>
+              <a:pPr algn="ctr"/>
+              <a:endParaRPr lang="en-IN"/>
+            </a:p>
+          </p:txBody>
+        </p:sp>
+        <p:pic>
+          <p:nvPicPr>
+            <p:cNvPr id="24" name="Graphic 23" descr="Open book with solid fill">
+              <a:extLst>
+                <a:ext uri="{FF2B5EF4-FFF2-40B4-BE49-F238E27FC236}">
+                  <a16:creationId xmlns:a16="http://schemas.microsoft.com/office/drawing/2014/main" id="{E6F650BA-91F6-EC86-74E2-9897444DAAE1}"/>
+                </a:ext>
+              </a:extLst>
+            </p:cNvPr>
+            <p:cNvPicPr>
+              <a:picLocks noChangeAspect="1"/>
+            </p:cNvPicPr>
+            <p:nvPr/>
+          </p:nvPicPr>
+          <p:blipFill>
+            <a:blip r:embed="rId14">
+              <a:extLst>
+                <a:ext uri="{28A0092B-C50C-407E-A947-70E740481C1C}">
+                  <a14:useLocalDpi xmlns:a14="http://schemas.microsoft.com/office/drawing/2010/main" val="0"/>
+                </a:ext>
+                <a:ext uri="{96DAC541-7B7A-43D3-8B79-37D633B846F1}">
+                  <asvg:svgBlip xmlns:asvg="http://schemas.microsoft.com/office/drawing/2016/SVG/main" r:embed="rId15"/>
+                </a:ext>
+              </a:extLst>
+            </a:blip>
+            <a:stretch>
+              <a:fillRect/>
+            </a:stretch>
+          </p:blipFill>
+          <p:spPr>
+            <a:xfrm>
+              <a:off x="347656" y="4153820"/>
+              <a:ext cx="793341" cy="793341"/>
+            </a:xfrm>
+            <a:prstGeom prst="rect">
+              <a:avLst/>
+            </a:prstGeom>
+          </p:spPr>
+        </p:pic>
+      </p:grpSp>
+      <p:grpSp>
+        <p:nvGrpSpPr>
+          <p:cNvPr id="25" name="Group 24">
+            <a:extLst>
+              <a:ext uri="{FF2B5EF4-FFF2-40B4-BE49-F238E27FC236}">
+                <a16:creationId xmlns:a16="http://schemas.microsoft.com/office/drawing/2014/main" id="{C7854776-A1C4-6A52-0663-7EAC2552DF2F}"/>
+              </a:ext>
+            </a:extLst>
+          </p:cNvPr>
+          <p:cNvGrpSpPr/>
+          <p:nvPr/>
+        </p:nvGrpSpPr>
+        <p:grpSpPr>
+          <a:xfrm>
+            <a:off x="8200104" y="177438"/>
+            <a:ext cx="3057830" cy="1101215"/>
+            <a:chOff x="6537829" y="389602"/>
+            <a:chExt cx="3057830" cy="1101215"/>
+          </a:xfrm>
+        </p:grpSpPr>
+        <p:sp>
+          <p:nvSpPr>
+            <p:cNvPr id="26" name="Rectangle: Rounded Corners 25">
+              <a:extLst>
+                <a:ext uri="{FF2B5EF4-FFF2-40B4-BE49-F238E27FC236}">
+                  <a16:creationId xmlns:a16="http://schemas.microsoft.com/office/drawing/2014/main" id="{FE4899C7-2D86-75E8-2634-77C0CE874C49}"/>
+                </a:ext>
+              </a:extLst>
+            </p:cNvPr>
+            <p:cNvSpPr/>
+            <p:nvPr/>
+          </p:nvSpPr>
+          <p:spPr>
+            <a:xfrm>
+              <a:off x="7278932" y="389602"/>
+              <a:ext cx="2316727" cy="1093843"/>
+            </a:xfrm>
+            <a:prstGeom prst="roundRect">
+              <a:avLst/>
+            </a:prstGeom>
+            <a:solidFill>
+              <a:schemeClr val="bg1"/>
+            </a:solidFill>
+            <a:ln>
+              <a:noFill/>
+            </a:ln>
+          </p:spPr>
+          <p:style>
+            <a:lnRef idx="2">
+              <a:schemeClr val="accent1">
+                <a:shade val="50000"/>
+              </a:schemeClr>
+            </a:lnRef>
+            <a:fillRef idx="1">
+              <a:schemeClr val="accent1"/>
+            </a:fillRef>
+            <a:effectRef idx="0">
+              <a:schemeClr val="accent1"/>
+            </a:effectRef>
+            <a:fontRef idx="minor">
+              <a:schemeClr val="lt1"/>
+            </a:fontRef>
+          </p:style>
+          <p:txBody>
+            <a:bodyPr rtlCol="0" anchor="ctr"/>
+            <a:lstStyle/>
+            <a:p>
+              <a:pPr algn="ctr"/>
+              <a:endParaRPr lang="en-IN"/>
+            </a:p>
+          </p:txBody>
+        </p:sp>
+        <p:sp>
+          <p:nvSpPr>
+            <p:cNvPr id="27" name="Rectangle: Rounded Corners 26">
+              <a:extLst>
+                <a:ext uri="{FF2B5EF4-FFF2-40B4-BE49-F238E27FC236}">
+                  <a16:creationId xmlns:a16="http://schemas.microsoft.com/office/drawing/2014/main" id="{5742811F-0ACD-049A-E191-FE1454091656}"/>
+                </a:ext>
+              </a:extLst>
+            </p:cNvPr>
+            <p:cNvSpPr/>
+            <p:nvPr/>
+          </p:nvSpPr>
+          <p:spPr>
+            <a:xfrm>
+              <a:off x="6537829" y="389605"/>
+              <a:ext cx="843114" cy="1101212"/>
+            </a:xfrm>
+            <a:prstGeom prst="roundRect">
+              <a:avLst/>
+            </a:prstGeom>
+            <a:solidFill>
+              <a:srgbClr val="00B050"/>
+            </a:solidFill>
+            <a:ln>
+              <a:noFill/>
+            </a:ln>
+          </p:spPr>
+          <p:style>
+            <a:lnRef idx="2">
+              <a:schemeClr val="accent1">
+                <a:shade val="50000"/>
+              </a:schemeClr>
+            </a:lnRef>
+            <a:fillRef idx="1">
+              <a:schemeClr val="accent1"/>
+            </a:fillRef>
+            <a:effectRef idx="0">
+              <a:schemeClr val="accent1"/>
+            </a:effectRef>
+            <a:fontRef idx="minor">
+              <a:schemeClr val="lt1"/>
+            </a:fontRef>
+          </p:style>
+          <p:txBody>
+            <a:bodyPr rtlCol="0" anchor="ctr"/>
+            <a:lstStyle/>
+            <a:p>
+              <a:pPr algn="ctr"/>
+              <a:endParaRPr lang="en-IN" dirty="0"/>
+            </a:p>
+          </p:txBody>
+        </p:sp>
+        <p:sp>
+          <p:nvSpPr>
+            <p:cNvPr id="28" name="Rectangle 27">
+              <a:extLst>
+                <a:ext uri="{FF2B5EF4-FFF2-40B4-BE49-F238E27FC236}">
+                  <a16:creationId xmlns:a16="http://schemas.microsoft.com/office/drawing/2014/main" id="{30F95380-5B58-BBD7-0FFE-F9CDD4D7BD73}"/>
+                </a:ext>
+              </a:extLst>
+            </p:cNvPr>
+            <p:cNvSpPr/>
+            <p:nvPr/>
+          </p:nvSpPr>
+          <p:spPr>
+            <a:xfrm>
+              <a:off x="7278933" y="389605"/>
+              <a:ext cx="195413" cy="1101212"/>
+            </a:xfrm>
+            <a:prstGeom prst="rect">
+              <a:avLst/>
+            </a:prstGeom>
+            <a:solidFill>
+              <a:srgbClr val="00B050"/>
+            </a:solidFill>
+            <a:ln>
+              <a:noFill/>
+            </a:ln>
+          </p:spPr>
+          <p:style>
+            <a:lnRef idx="2">
+              <a:schemeClr val="accent1">
+                <a:shade val="50000"/>
+              </a:schemeClr>
+            </a:lnRef>
+            <a:fillRef idx="1">
+              <a:schemeClr val="accent1"/>
+            </a:fillRef>
+            <a:effectRef idx="0">
+              <a:schemeClr val="accent1"/>
+            </a:effectRef>
+            <a:fontRef idx="minor">
+              <a:schemeClr val="lt1"/>
+            </a:fontRef>
+          </p:style>
+          <p:txBody>
+            <a:bodyPr rtlCol="0" anchor="ctr"/>
+            <a:lstStyle/>
+            <a:p>
+              <a:pPr algn="ctr"/>
+              <a:endParaRPr lang="en-IN"/>
+            </a:p>
+          </p:txBody>
+        </p:sp>
+        <p:pic>
+          <p:nvPicPr>
+            <p:cNvPr id="29" name="Graphic 28" descr="Social network with solid fill">
+              <a:extLst>
+                <a:ext uri="{FF2B5EF4-FFF2-40B4-BE49-F238E27FC236}">
+                  <a16:creationId xmlns:a16="http://schemas.microsoft.com/office/drawing/2014/main" id="{F6E87667-D74A-8A57-92D4-3B5492D04A95}"/>
+                </a:ext>
+              </a:extLst>
+            </p:cNvPr>
+            <p:cNvPicPr>
+              <a:picLocks noChangeAspect="1"/>
+            </p:cNvPicPr>
+            <p:nvPr/>
+          </p:nvPicPr>
+          <p:blipFill>
+            <a:blip r:embed="rId8">
+              <a:extLst>
+                <a:ext uri="{28A0092B-C50C-407E-A947-70E740481C1C}">
+                  <a14:useLocalDpi xmlns:a14="http://schemas.microsoft.com/office/drawing/2010/main" val="0"/>
+                </a:ext>
+                <a:ext uri="{96DAC541-7B7A-43D3-8B79-37D633B846F1}">
+                  <asvg:svgBlip xmlns:asvg="http://schemas.microsoft.com/office/drawing/2016/SVG/main" r:embed="rId9"/>
+                </a:ext>
+              </a:extLst>
+            </a:blip>
+            <a:stretch>
+              <a:fillRect/>
+            </a:stretch>
+          </p:blipFill>
+          <p:spPr>
+            <a:xfrm>
+              <a:off x="6582069" y="513735"/>
+              <a:ext cx="845575" cy="845575"/>
+            </a:xfrm>
+            <a:prstGeom prst="rect">
+              <a:avLst/>
+            </a:prstGeom>
+          </p:spPr>
+        </p:pic>
+      </p:grpSp>
+      <p:grpSp>
+        <p:nvGrpSpPr>
+          <p:cNvPr id="30" name="Group 29">
+            <a:extLst>
+              <a:ext uri="{FF2B5EF4-FFF2-40B4-BE49-F238E27FC236}">
+                <a16:creationId xmlns:a16="http://schemas.microsoft.com/office/drawing/2014/main" id="{72A9BED8-EEC8-C7FC-B9B1-8AEC9C67CF84}"/>
+              </a:ext>
+            </a:extLst>
+          </p:cNvPr>
+          <p:cNvGrpSpPr/>
+          <p:nvPr/>
+        </p:nvGrpSpPr>
+        <p:grpSpPr>
+          <a:xfrm>
+            <a:off x="8200104" y="1525843"/>
+            <a:ext cx="3057830" cy="1101215"/>
+            <a:chOff x="6429675" y="1545507"/>
+            <a:chExt cx="3057830" cy="1101215"/>
+          </a:xfrm>
+        </p:grpSpPr>
+        <p:sp>
+          <p:nvSpPr>
+            <p:cNvPr id="31" name="Rectangle: Rounded Corners 30">
+              <a:extLst>
+                <a:ext uri="{FF2B5EF4-FFF2-40B4-BE49-F238E27FC236}">
+                  <a16:creationId xmlns:a16="http://schemas.microsoft.com/office/drawing/2014/main" id="{7E3E834F-65CA-A49F-A79D-43015265085E}"/>
+                </a:ext>
+              </a:extLst>
+            </p:cNvPr>
+            <p:cNvSpPr/>
+            <p:nvPr/>
+          </p:nvSpPr>
+          <p:spPr>
+            <a:xfrm>
+              <a:off x="7170778" y="1545507"/>
+              <a:ext cx="2316727" cy="1093843"/>
+            </a:xfrm>
+            <a:prstGeom prst="roundRect">
+              <a:avLst/>
+            </a:prstGeom>
+            <a:solidFill>
+              <a:schemeClr val="bg1"/>
+            </a:solidFill>
+            <a:ln>
+              <a:noFill/>
+            </a:ln>
+          </p:spPr>
+          <p:style>
+            <a:lnRef idx="2">
+              <a:schemeClr val="accent1">
+                <a:shade val="50000"/>
+              </a:schemeClr>
+            </a:lnRef>
+            <a:fillRef idx="1">
+              <a:schemeClr val="accent1"/>
+            </a:fillRef>
+            <a:effectRef idx="0">
+              <a:schemeClr val="accent1"/>
+            </a:effectRef>
+            <a:fontRef idx="minor">
+              <a:schemeClr val="lt1"/>
+            </a:fontRef>
+          </p:style>
+          <p:txBody>
+            <a:bodyPr rtlCol="0" anchor="ctr"/>
+            <a:lstStyle/>
+            <a:p>
+              <a:pPr algn="ctr"/>
+              <a:endParaRPr lang="en-IN"/>
+            </a:p>
+          </p:txBody>
+        </p:sp>
+        <p:sp>
+          <p:nvSpPr>
+            <p:cNvPr id="32" name="Rectangle: Rounded Corners 31">
+              <a:extLst>
+                <a:ext uri="{FF2B5EF4-FFF2-40B4-BE49-F238E27FC236}">
+                  <a16:creationId xmlns:a16="http://schemas.microsoft.com/office/drawing/2014/main" id="{4EEFC217-82D9-91E4-EDB8-F28C88A5A19F}"/>
+                </a:ext>
+              </a:extLst>
+            </p:cNvPr>
+            <p:cNvSpPr/>
+            <p:nvPr/>
+          </p:nvSpPr>
+          <p:spPr>
+            <a:xfrm>
+              <a:off x="6429675" y="1545510"/>
+              <a:ext cx="843114" cy="1101212"/>
+            </a:xfrm>
+            <a:prstGeom prst="roundRect">
+              <a:avLst/>
+            </a:prstGeom>
+            <a:solidFill>
+              <a:srgbClr val="00B050"/>
+            </a:solidFill>
+            <a:ln>
+              <a:noFill/>
+            </a:ln>
+          </p:spPr>
+          <p:style>
+            <a:lnRef idx="2">
+              <a:schemeClr val="accent1">
+                <a:shade val="50000"/>
+              </a:schemeClr>
+            </a:lnRef>
+            <a:fillRef idx="1">
+              <a:schemeClr val="accent1"/>
+            </a:fillRef>
+            <a:effectRef idx="0">
+              <a:schemeClr val="accent1"/>
+            </a:effectRef>
+            <a:fontRef idx="minor">
+              <a:schemeClr val="lt1"/>
+            </a:fontRef>
+          </p:style>
+          <p:txBody>
+            <a:bodyPr rtlCol="0" anchor="ctr"/>
+            <a:lstStyle/>
+            <a:p>
+              <a:pPr algn="ctr"/>
+              <a:endParaRPr lang="en-IN" dirty="0"/>
+            </a:p>
+          </p:txBody>
+        </p:sp>
+        <p:sp>
+          <p:nvSpPr>
+            <p:cNvPr id="33" name="Rectangle 32">
+              <a:extLst>
+                <a:ext uri="{FF2B5EF4-FFF2-40B4-BE49-F238E27FC236}">
+                  <a16:creationId xmlns:a16="http://schemas.microsoft.com/office/drawing/2014/main" id="{62409E4B-3BF5-8F35-4157-0782E297C0C5}"/>
+                </a:ext>
+              </a:extLst>
+            </p:cNvPr>
+            <p:cNvSpPr/>
+            <p:nvPr/>
+          </p:nvSpPr>
+          <p:spPr>
+            <a:xfrm>
+              <a:off x="7170779" y="1545510"/>
+              <a:ext cx="195413" cy="1101212"/>
+            </a:xfrm>
+            <a:prstGeom prst="rect">
+              <a:avLst/>
+            </a:prstGeom>
+            <a:solidFill>
+              <a:srgbClr val="00B050"/>
+            </a:solidFill>
+            <a:ln>
+              <a:noFill/>
+            </a:ln>
+          </p:spPr>
+          <p:style>
+            <a:lnRef idx="2">
+              <a:schemeClr val="accent1">
+                <a:shade val="50000"/>
+              </a:schemeClr>
+            </a:lnRef>
+            <a:fillRef idx="1">
+              <a:schemeClr val="accent1"/>
+            </a:fillRef>
+            <a:effectRef idx="0">
+              <a:schemeClr val="accent1"/>
+            </a:effectRef>
+            <a:fontRef idx="minor">
+              <a:schemeClr val="lt1"/>
+            </a:fontRef>
+          </p:style>
+          <p:txBody>
+            <a:bodyPr rtlCol="0" anchor="ctr"/>
+            <a:lstStyle/>
+            <a:p>
+              <a:pPr algn="ctr"/>
+              <a:endParaRPr lang="en-IN"/>
+            </a:p>
+          </p:txBody>
+        </p:sp>
+        <p:pic>
+          <p:nvPicPr>
+            <p:cNvPr id="34" name="Graphic 33" descr="Bank with solid fill">
+              <a:extLst>
+                <a:ext uri="{FF2B5EF4-FFF2-40B4-BE49-F238E27FC236}">
+                  <a16:creationId xmlns:a16="http://schemas.microsoft.com/office/drawing/2014/main" id="{D14A859C-FC47-7D9B-37A2-FDDF5730DA88}"/>
+                </a:ext>
+              </a:extLst>
+            </p:cNvPr>
+            <p:cNvPicPr>
+              <a:picLocks noChangeAspect="1"/>
+            </p:cNvPicPr>
+            <p:nvPr/>
+          </p:nvPicPr>
+          <p:blipFill>
+            <a:blip r:embed="rId16">
+              <a:extLst>
+                <a:ext uri="{28A0092B-C50C-407E-A947-70E740481C1C}">
+                  <a14:useLocalDpi xmlns:a14="http://schemas.microsoft.com/office/drawing/2010/main" val="0"/>
+                </a:ext>
+                <a:ext uri="{96DAC541-7B7A-43D3-8B79-37D633B846F1}">
+                  <asvg:svgBlip xmlns:asvg="http://schemas.microsoft.com/office/drawing/2016/SVG/main" r:embed="rId17"/>
+                </a:ext>
+              </a:extLst>
+            </a:blip>
+            <a:stretch>
+              <a:fillRect/>
+            </a:stretch>
+          </p:blipFill>
+          <p:spPr>
+            <a:xfrm>
+              <a:off x="6439502" y="1635228"/>
+              <a:ext cx="914400" cy="914400"/>
+            </a:xfrm>
+            <a:prstGeom prst="rect">
+              <a:avLst/>
+            </a:prstGeom>
+          </p:spPr>
+        </p:pic>
+      </p:grpSp>
+      <p:grpSp>
+        <p:nvGrpSpPr>
+          <p:cNvPr id="35" name="Group 34">
+            <a:extLst>
+              <a:ext uri="{FF2B5EF4-FFF2-40B4-BE49-F238E27FC236}">
+                <a16:creationId xmlns:a16="http://schemas.microsoft.com/office/drawing/2014/main" id="{635ACF6E-226D-8A76-2117-3D8F042B3111}"/>
+              </a:ext>
+            </a:extLst>
+          </p:cNvPr>
+          <p:cNvGrpSpPr/>
+          <p:nvPr/>
+        </p:nvGrpSpPr>
+        <p:grpSpPr>
+          <a:xfrm>
+            <a:off x="8200104" y="2763481"/>
+            <a:ext cx="3057830" cy="1101215"/>
+            <a:chOff x="6429675" y="2783145"/>
+            <a:chExt cx="3057830" cy="1101215"/>
+          </a:xfrm>
+        </p:grpSpPr>
+        <p:sp>
+          <p:nvSpPr>
+            <p:cNvPr id="36" name="Rectangle: Rounded Corners 35">
+              <a:extLst>
+                <a:ext uri="{FF2B5EF4-FFF2-40B4-BE49-F238E27FC236}">
+                  <a16:creationId xmlns:a16="http://schemas.microsoft.com/office/drawing/2014/main" id="{CC7C9779-8FC0-6B52-CA45-D0E838ADE2A4}"/>
+                </a:ext>
+              </a:extLst>
+            </p:cNvPr>
+            <p:cNvSpPr/>
+            <p:nvPr/>
+          </p:nvSpPr>
+          <p:spPr>
+            <a:xfrm>
+              <a:off x="7170778" y="2783145"/>
+              <a:ext cx="2316727" cy="1093843"/>
+            </a:xfrm>
+            <a:prstGeom prst="roundRect">
+              <a:avLst/>
+            </a:prstGeom>
+            <a:solidFill>
+              <a:schemeClr val="bg1"/>
+            </a:solidFill>
+            <a:ln>
+              <a:noFill/>
+            </a:ln>
+          </p:spPr>
+          <p:style>
+            <a:lnRef idx="2">
+              <a:schemeClr val="accent1">
+                <a:shade val="50000"/>
+              </a:schemeClr>
+            </a:lnRef>
+            <a:fillRef idx="1">
+              <a:schemeClr val="accent1"/>
+            </a:fillRef>
+            <a:effectRef idx="0">
+              <a:schemeClr val="accent1"/>
+            </a:effectRef>
+            <a:fontRef idx="minor">
+              <a:schemeClr val="lt1"/>
+            </a:fontRef>
+          </p:style>
+          <p:txBody>
+            <a:bodyPr rtlCol="0" anchor="ctr"/>
+            <a:lstStyle/>
+            <a:p>
+              <a:pPr algn="ctr"/>
+              <a:endParaRPr lang="en-IN"/>
+            </a:p>
+          </p:txBody>
+        </p:sp>
+        <p:sp>
+          <p:nvSpPr>
+            <p:cNvPr id="37" name="Rectangle: Rounded Corners 36">
+              <a:extLst>
+                <a:ext uri="{FF2B5EF4-FFF2-40B4-BE49-F238E27FC236}">
+                  <a16:creationId xmlns:a16="http://schemas.microsoft.com/office/drawing/2014/main" id="{76048C42-DB05-E471-4B5B-011077B9BC75}"/>
+                </a:ext>
+              </a:extLst>
+            </p:cNvPr>
+            <p:cNvSpPr/>
+            <p:nvPr/>
+          </p:nvSpPr>
+          <p:spPr>
+            <a:xfrm>
+              <a:off x="6429675" y="2783148"/>
+              <a:ext cx="843114" cy="1101212"/>
+            </a:xfrm>
+            <a:prstGeom prst="roundRect">
+              <a:avLst/>
+            </a:prstGeom>
+            <a:solidFill>
+              <a:srgbClr val="00B050"/>
+            </a:solidFill>
+            <a:ln>
+              <a:noFill/>
+            </a:ln>
+          </p:spPr>
+          <p:style>
+            <a:lnRef idx="2">
+              <a:schemeClr val="accent1">
+                <a:shade val="50000"/>
+              </a:schemeClr>
+            </a:lnRef>
+            <a:fillRef idx="1">
+              <a:schemeClr val="accent1"/>
+            </a:fillRef>
+            <a:effectRef idx="0">
+              <a:schemeClr val="accent1"/>
+            </a:effectRef>
+            <a:fontRef idx="minor">
+              <a:schemeClr val="lt1"/>
+            </a:fontRef>
+          </p:style>
+          <p:txBody>
+            <a:bodyPr rtlCol="0" anchor="ctr"/>
+            <a:lstStyle/>
+            <a:p>
+              <a:pPr algn="ctr"/>
+              <a:endParaRPr lang="en-IN" dirty="0"/>
+            </a:p>
+          </p:txBody>
+        </p:sp>
+        <p:sp>
+          <p:nvSpPr>
+            <p:cNvPr id="38" name="Rectangle 37">
+              <a:extLst>
+                <a:ext uri="{FF2B5EF4-FFF2-40B4-BE49-F238E27FC236}">
+                  <a16:creationId xmlns:a16="http://schemas.microsoft.com/office/drawing/2014/main" id="{ECFB8EAF-F7D3-5DD4-C5F4-E8D9F71EB30E}"/>
+                </a:ext>
+              </a:extLst>
+            </p:cNvPr>
+            <p:cNvSpPr/>
+            <p:nvPr/>
+          </p:nvSpPr>
+          <p:spPr>
+            <a:xfrm>
+              <a:off x="7170779" y="2783148"/>
+              <a:ext cx="195413" cy="1101212"/>
+            </a:xfrm>
+            <a:prstGeom prst="rect">
+              <a:avLst/>
+            </a:prstGeom>
+            <a:solidFill>
+              <a:srgbClr val="00B050"/>
+            </a:solidFill>
+            <a:ln>
+              <a:noFill/>
+            </a:ln>
+          </p:spPr>
+          <p:style>
+            <a:lnRef idx="2">
+              <a:schemeClr val="accent1">
+                <a:shade val="50000"/>
+              </a:schemeClr>
+            </a:lnRef>
+            <a:fillRef idx="1">
+              <a:schemeClr val="accent1"/>
+            </a:fillRef>
+            <a:effectRef idx="0">
+              <a:schemeClr val="accent1"/>
+            </a:effectRef>
+            <a:fontRef idx="minor">
+              <a:schemeClr val="lt1"/>
+            </a:fontRef>
+          </p:style>
+          <p:txBody>
+            <a:bodyPr rtlCol="0" anchor="ctr"/>
+            <a:lstStyle/>
+            <a:p>
+              <a:pPr algn="ctr"/>
+              <a:endParaRPr lang="en-IN"/>
+            </a:p>
+          </p:txBody>
+        </p:sp>
+        <p:pic>
+          <p:nvPicPr>
+            <p:cNvPr id="39" name="Graphic 38" descr="Branching diagram with solid fill">
+              <a:extLst>
+                <a:ext uri="{FF2B5EF4-FFF2-40B4-BE49-F238E27FC236}">
+                  <a16:creationId xmlns:a16="http://schemas.microsoft.com/office/drawing/2014/main" id="{6BEFFAA9-9E17-2217-3775-F2810B2E7C44}"/>
+                </a:ext>
+              </a:extLst>
+            </p:cNvPr>
+            <p:cNvPicPr>
+              <a:picLocks noChangeAspect="1"/>
+            </p:cNvPicPr>
+            <p:nvPr/>
+          </p:nvPicPr>
+          <p:blipFill>
+            <a:blip r:embed="rId18">
+              <a:extLst>
+                <a:ext uri="{28A0092B-C50C-407E-A947-70E740481C1C}">
+                  <a14:useLocalDpi xmlns:a14="http://schemas.microsoft.com/office/drawing/2010/main" val="0"/>
+                </a:ext>
+                <a:ext uri="{96DAC541-7B7A-43D3-8B79-37D633B846F1}">
+                  <asvg:svgBlip xmlns:asvg="http://schemas.microsoft.com/office/drawing/2016/SVG/main" r:embed="rId19"/>
+                </a:ext>
+              </a:extLst>
+            </a:blip>
+            <a:stretch>
+              <a:fillRect/>
+            </a:stretch>
+          </p:blipFill>
+          <p:spPr>
+            <a:xfrm>
+              <a:off x="6476376" y="2952291"/>
+              <a:ext cx="843114" cy="843114"/>
+            </a:xfrm>
+            <a:prstGeom prst="rect">
+              <a:avLst/>
+            </a:prstGeom>
+          </p:spPr>
+        </p:pic>
+      </p:grpSp>
     </p:spTree>
     <p:extLst>
       <p:ext uri="{BB962C8B-B14F-4D97-AF65-F5344CB8AC3E}">
         <p14:creationId xmlns:p14="http://schemas.microsoft.com/office/powerpoint/2010/main" val="294955414"/>
-      </p:ext>
-    </p:extLst>
-  </p:cSld>
-  <p:clrMapOvr>
-    <a:masterClrMapping/>
-  </p:clrMapOvr>
-</p:sld>
-</file>
-
-<file path=ppt/slides/slide2.xml><?xml version="1.0" encoding="utf-8"?>
-<p:sld xmlns:a="http://schemas.openxmlformats.org/drawingml/2006/main" xmlns:r="http://schemas.openxmlformats.org/officeDocument/2006/relationships" xmlns:p="http://schemas.openxmlformats.org/presentationml/2006/main">
-  <p:cSld>
-    <p:spTree>
-      <p:nvGrpSpPr>
-        <p:cNvPr id="1" name=""/>
-        <p:cNvGrpSpPr/>
-        <p:nvPr/>
-      </p:nvGrpSpPr>
-      <p:grpSpPr>
-        <a:xfrm>
-          <a:off x="0" y="0"/>
-          <a:ext cx="0" cy="0"/>
-          <a:chOff x="0" y="0"/>
-          <a:chExt cx="0" cy="0"/>
-        </a:xfrm>
-      </p:grpSpPr>
-      <p:sp>
-        <p:nvSpPr>
-          <p:cNvPr id="13" name="Rectangle: Rounded Corners 12">
-            <a:extLst>
-              <a:ext uri="{FF2B5EF4-FFF2-40B4-BE49-F238E27FC236}">
-                <a16:creationId xmlns:a16="http://schemas.microsoft.com/office/drawing/2014/main" id="{ED0B468A-9F44-0F55-1F3C-82858D5A233A}"/>
-              </a:ext>
-            </a:extLst>
-          </p:cNvPr>
-          <p:cNvSpPr/>
-          <p:nvPr/>
-        </p:nvSpPr>
-        <p:spPr>
-          <a:xfrm>
-            <a:off x="4320046" y="2536720"/>
-            <a:ext cx="2316727" cy="1093843"/>
-          </a:xfrm>
-          <a:prstGeom prst="roundRect">
-            <a:avLst/>
-          </a:prstGeom>
-          <a:solidFill>
-            <a:schemeClr val="bg1"/>
-          </a:solidFill>
-          <a:ln>
-            <a:noFill/>
-          </a:ln>
-        </p:spPr>
-        <p:style>
-          <a:lnRef idx="2">
-            <a:schemeClr val="accent1">
-              <a:shade val="50000"/>
-            </a:schemeClr>
-          </a:lnRef>
-          <a:fillRef idx="1">
-            <a:schemeClr val="accent1"/>
-          </a:fillRef>
-          <a:effectRef idx="0">
-            <a:schemeClr val="accent1"/>
-          </a:effectRef>
-          <a:fontRef idx="minor">
-            <a:schemeClr val="lt1"/>
-          </a:fontRef>
-        </p:style>
-        <p:txBody>
-          <a:bodyPr rtlCol="0" anchor="ctr"/>
-          <a:lstStyle/>
-          <a:p>
-            <a:pPr algn="ctr"/>
-            <a:endParaRPr lang="en-IN"/>
-          </a:p>
-        </p:txBody>
-      </p:sp>
-      <p:sp>
-        <p:nvSpPr>
-          <p:cNvPr id="6" name="Rectangle: Rounded Corners 5">
-            <a:extLst>
-              <a:ext uri="{FF2B5EF4-FFF2-40B4-BE49-F238E27FC236}">
-                <a16:creationId xmlns:a16="http://schemas.microsoft.com/office/drawing/2014/main" id="{1AE21F3E-45FF-0CF0-67CE-0BCF1C555A07}"/>
-              </a:ext>
-            </a:extLst>
-          </p:cNvPr>
-          <p:cNvSpPr/>
-          <p:nvPr/>
-        </p:nvSpPr>
-        <p:spPr>
-          <a:xfrm>
-            <a:off x="3578943" y="2536723"/>
-            <a:ext cx="843114" cy="1101212"/>
-          </a:xfrm>
-          <a:prstGeom prst="roundRect">
-            <a:avLst/>
-          </a:prstGeom>
-          <a:solidFill>
-            <a:srgbClr val="0070C0"/>
-          </a:solidFill>
-          <a:ln>
-            <a:noFill/>
-          </a:ln>
-        </p:spPr>
-        <p:style>
-          <a:lnRef idx="2">
-            <a:schemeClr val="accent1">
-              <a:shade val="50000"/>
-            </a:schemeClr>
-          </a:lnRef>
-          <a:fillRef idx="1">
-            <a:schemeClr val="accent1"/>
-          </a:fillRef>
-          <a:effectRef idx="0">
-            <a:schemeClr val="accent1"/>
-          </a:effectRef>
-          <a:fontRef idx="minor">
-            <a:schemeClr val="lt1"/>
-          </a:fontRef>
-        </p:style>
-        <p:txBody>
-          <a:bodyPr rtlCol="0" anchor="ctr"/>
-          <a:lstStyle/>
-          <a:p>
-            <a:pPr algn="ctr"/>
-            <a:endParaRPr lang="en-IN"/>
-          </a:p>
-        </p:txBody>
-      </p:sp>
-      <p:sp>
-        <p:nvSpPr>
-          <p:cNvPr id="10" name="Rectangle 9">
-            <a:extLst>
-              <a:ext uri="{FF2B5EF4-FFF2-40B4-BE49-F238E27FC236}">
-                <a16:creationId xmlns:a16="http://schemas.microsoft.com/office/drawing/2014/main" id="{F72C980C-AAFF-8785-541B-6D8EF82CC205}"/>
-              </a:ext>
-            </a:extLst>
-          </p:cNvPr>
-          <p:cNvSpPr/>
-          <p:nvPr/>
-        </p:nvSpPr>
-        <p:spPr>
-          <a:xfrm>
-            <a:off x="4320047" y="2536721"/>
-            <a:ext cx="195413" cy="1101212"/>
-          </a:xfrm>
-          <a:prstGeom prst="rect">
-            <a:avLst/>
-          </a:prstGeom>
-          <a:solidFill>
-            <a:srgbClr val="0070C0"/>
-          </a:solidFill>
-          <a:ln>
-            <a:noFill/>
-          </a:ln>
-        </p:spPr>
-        <p:style>
-          <a:lnRef idx="2">
-            <a:schemeClr val="accent1">
-              <a:shade val="50000"/>
-            </a:schemeClr>
-          </a:lnRef>
-          <a:fillRef idx="1">
-            <a:schemeClr val="accent1"/>
-          </a:fillRef>
-          <a:effectRef idx="0">
-            <a:schemeClr val="accent1"/>
-          </a:effectRef>
-          <a:fontRef idx="minor">
-            <a:schemeClr val="lt1"/>
-          </a:fontRef>
-        </p:style>
-        <p:txBody>
-          <a:bodyPr rtlCol="0" anchor="ctr"/>
-          <a:lstStyle/>
-          <a:p>
-            <a:pPr algn="ctr"/>
-            <a:endParaRPr lang="en-IN"/>
-          </a:p>
-        </p:txBody>
-      </p:sp>
-      <p:pic>
-        <p:nvPicPr>
-          <p:cNvPr id="12" name="Graphic 11" descr="Social network with solid fill">
-            <a:extLst>
-              <a:ext uri="{FF2B5EF4-FFF2-40B4-BE49-F238E27FC236}">
-                <a16:creationId xmlns:a16="http://schemas.microsoft.com/office/drawing/2014/main" id="{8E5B24D0-B653-79D5-E9AB-8DDD17F9DB71}"/>
-              </a:ext>
-            </a:extLst>
-          </p:cNvPr>
-          <p:cNvPicPr>
-            <a:picLocks noChangeAspect="1"/>
-          </p:cNvPicPr>
-          <p:nvPr/>
-        </p:nvPicPr>
-        <p:blipFill>
-          <a:blip r:embed="rId2">
-            <a:extLst>
-              <a:ext uri="{28A0092B-C50C-407E-A947-70E740481C1C}">
-                <a14:useLocalDpi xmlns:a14="http://schemas.microsoft.com/office/drawing/2010/main" val="0"/>
-              </a:ext>
-              <a:ext uri="{96DAC541-7B7A-43D3-8B79-37D633B846F1}">
-                <asvg:svgBlip xmlns:asvg="http://schemas.microsoft.com/office/drawing/2016/SVG/main" r:embed="rId3"/>
-              </a:ext>
-            </a:extLst>
-          </a:blip>
-          <a:stretch>
-            <a:fillRect/>
-          </a:stretch>
-        </p:blipFill>
-        <p:spPr>
-          <a:xfrm>
-            <a:off x="3672346" y="2660853"/>
-            <a:ext cx="845575" cy="845575"/>
-          </a:xfrm>
-          <a:prstGeom prst="rect">
-            <a:avLst/>
-          </a:prstGeom>
-        </p:spPr>
-      </p:pic>
-    </p:spTree>
-    <p:extLst>
-      <p:ext uri="{BB962C8B-B14F-4D97-AF65-F5344CB8AC3E}">
-        <p14:creationId xmlns:p14="http://schemas.microsoft.com/office/powerpoint/2010/main" val="225211963"/>
       </p:ext>
     </p:extLst>
   </p:cSld>

</xml_diff>

<commit_message>
Completed PowerBI Assignment 2
</commit_message>
<xml_diff>
--- a/Power_BI_Project_Assignments/Icons.pptx
+++ b/Power_BI_Project_Assignments/Icons.pptx
@@ -7,6 +7,7 @@
   <p:sldIdLst>
     <p:sldId id="256" r:id="rId2"/>
     <p:sldId id="257" r:id="rId3"/>
+    <p:sldId id="258" r:id="rId4"/>
   </p:sldIdLst>
   <p:sldSz cx="12192000" cy="6858000"/>
   <p:notesSz cx="6858000" cy="9144000"/>
@@ -262,7 +263,7 @@
           <a:p>
             <a:fld id="{28E05424-D9A3-49CC-9B54-DFC4393D1FDE}" type="datetimeFigureOut">
               <a:rPr lang="en-IN" smtClean="0"/>
-              <a:t>04-11-2022</a:t>
+              <a:t>05-11-2022</a:t>
             </a:fld>
             <a:endParaRPr lang="en-IN"/>
           </a:p>
@@ -462,7 +463,7 @@
           <a:p>
             <a:fld id="{28E05424-D9A3-49CC-9B54-DFC4393D1FDE}" type="datetimeFigureOut">
               <a:rPr lang="en-IN" smtClean="0"/>
-              <a:t>04-11-2022</a:t>
+              <a:t>05-11-2022</a:t>
             </a:fld>
             <a:endParaRPr lang="en-IN"/>
           </a:p>
@@ -672,7 +673,7 @@
           <a:p>
             <a:fld id="{28E05424-D9A3-49CC-9B54-DFC4393D1FDE}" type="datetimeFigureOut">
               <a:rPr lang="en-IN" smtClean="0"/>
-              <a:t>04-11-2022</a:t>
+              <a:t>05-11-2022</a:t>
             </a:fld>
             <a:endParaRPr lang="en-IN"/>
           </a:p>
@@ -872,7 +873,7 @@
           <a:p>
             <a:fld id="{28E05424-D9A3-49CC-9B54-DFC4393D1FDE}" type="datetimeFigureOut">
               <a:rPr lang="en-IN" smtClean="0"/>
-              <a:t>04-11-2022</a:t>
+              <a:t>05-11-2022</a:t>
             </a:fld>
             <a:endParaRPr lang="en-IN"/>
           </a:p>
@@ -1148,7 +1149,7 @@
           <a:p>
             <a:fld id="{28E05424-D9A3-49CC-9B54-DFC4393D1FDE}" type="datetimeFigureOut">
               <a:rPr lang="en-IN" smtClean="0"/>
-              <a:t>04-11-2022</a:t>
+              <a:t>05-11-2022</a:t>
             </a:fld>
             <a:endParaRPr lang="en-IN"/>
           </a:p>
@@ -1416,7 +1417,7 @@
           <a:p>
             <a:fld id="{28E05424-D9A3-49CC-9B54-DFC4393D1FDE}" type="datetimeFigureOut">
               <a:rPr lang="en-IN" smtClean="0"/>
-              <a:t>04-11-2022</a:t>
+              <a:t>05-11-2022</a:t>
             </a:fld>
             <a:endParaRPr lang="en-IN"/>
           </a:p>
@@ -1831,7 +1832,7 @@
           <a:p>
             <a:fld id="{28E05424-D9A3-49CC-9B54-DFC4393D1FDE}" type="datetimeFigureOut">
               <a:rPr lang="en-IN" smtClean="0"/>
-              <a:t>04-11-2022</a:t>
+              <a:t>05-11-2022</a:t>
             </a:fld>
             <a:endParaRPr lang="en-IN"/>
           </a:p>
@@ -1973,7 +1974,7 @@
           <a:p>
             <a:fld id="{28E05424-D9A3-49CC-9B54-DFC4393D1FDE}" type="datetimeFigureOut">
               <a:rPr lang="en-IN" smtClean="0"/>
-              <a:t>04-11-2022</a:t>
+              <a:t>05-11-2022</a:t>
             </a:fld>
             <a:endParaRPr lang="en-IN"/>
           </a:p>
@@ -2086,7 +2087,7 @@
           <a:p>
             <a:fld id="{28E05424-D9A3-49CC-9B54-DFC4393D1FDE}" type="datetimeFigureOut">
               <a:rPr lang="en-IN" smtClean="0"/>
-              <a:t>04-11-2022</a:t>
+              <a:t>05-11-2022</a:t>
             </a:fld>
             <a:endParaRPr lang="en-IN"/>
           </a:p>
@@ -2399,7 +2400,7 @@
           <a:p>
             <a:fld id="{28E05424-D9A3-49CC-9B54-DFC4393D1FDE}" type="datetimeFigureOut">
               <a:rPr lang="en-IN" smtClean="0"/>
-              <a:t>04-11-2022</a:t>
+              <a:t>05-11-2022</a:t>
             </a:fld>
             <a:endParaRPr lang="en-IN"/>
           </a:p>
@@ -2688,7 +2689,7 @@
           <a:p>
             <a:fld id="{28E05424-D9A3-49CC-9B54-DFC4393D1FDE}" type="datetimeFigureOut">
               <a:rPr lang="en-IN" smtClean="0"/>
-              <a:t>04-11-2022</a:t>
+              <a:t>05-11-2022</a:t>
             </a:fld>
             <a:endParaRPr lang="en-IN"/>
           </a:p>
@@ -2931,7 +2932,7 @@
           <a:p>
             <a:fld id="{28E05424-D9A3-49CC-9B54-DFC4393D1FDE}" type="datetimeFigureOut">
               <a:rPr lang="en-IN" smtClean="0"/>
-              <a:t>04-11-2022</a:t>
+              <a:t>05-11-2022</a:t>
             </a:fld>
             <a:endParaRPr lang="en-IN"/>
           </a:p>
@@ -5207,6 +5208,126 @@
 </p:sld>
 </file>
 
+<file path=ppt/slides/slide3.xml><?xml version="1.0" encoding="utf-8"?>
+<p:sld xmlns:a="http://schemas.openxmlformats.org/drawingml/2006/main" xmlns:r="http://schemas.openxmlformats.org/officeDocument/2006/relationships" xmlns:p="http://schemas.openxmlformats.org/presentationml/2006/main">
+  <p:cSld>
+    <p:spTree>
+      <p:nvGrpSpPr>
+        <p:cNvPr id="1" name=""/>
+        <p:cNvGrpSpPr/>
+        <p:nvPr/>
+      </p:nvGrpSpPr>
+      <p:grpSpPr>
+        <a:xfrm>
+          <a:off x="0" y="0"/>
+          <a:ext cx="0" cy="0"/>
+          <a:chOff x="0" y="0"/>
+          <a:chExt cx="0" cy="0"/>
+        </a:xfrm>
+      </p:grpSpPr>
+      <p:pic>
+        <p:nvPicPr>
+          <p:cNvPr id="7" name="Picture 6">
+            <a:extLst>
+              <a:ext uri="{FF2B5EF4-FFF2-40B4-BE49-F238E27FC236}">
+                <a16:creationId xmlns:a16="http://schemas.microsoft.com/office/drawing/2014/main" id="{7AB31596-224A-1613-C3CD-FFB2DD2F39AE}"/>
+              </a:ext>
+            </a:extLst>
+          </p:cNvPr>
+          <p:cNvPicPr>
+            <a:picLocks noChangeAspect="1"/>
+          </p:cNvPicPr>
+          <p:nvPr/>
+        </p:nvPicPr>
+        <p:blipFill>
+          <a:blip r:embed="rId2"/>
+          <a:stretch>
+            <a:fillRect/>
+          </a:stretch>
+        </p:blipFill>
+        <p:spPr>
+          <a:xfrm>
+            <a:off x="182388" y="175778"/>
+            <a:ext cx="4900890" cy="2626416"/>
+          </a:xfrm>
+          <a:prstGeom prst="rect">
+            <a:avLst/>
+          </a:prstGeom>
+        </p:spPr>
+      </p:pic>
+      <p:pic>
+        <p:nvPicPr>
+          <p:cNvPr id="3" name="Picture 2">
+            <a:extLst>
+              <a:ext uri="{FF2B5EF4-FFF2-40B4-BE49-F238E27FC236}">
+                <a16:creationId xmlns:a16="http://schemas.microsoft.com/office/drawing/2014/main" id="{8DE60006-4495-7734-AD31-7375839A8C92}"/>
+              </a:ext>
+            </a:extLst>
+          </p:cNvPr>
+          <p:cNvPicPr>
+            <a:picLocks noChangeAspect="1"/>
+          </p:cNvPicPr>
+          <p:nvPr/>
+        </p:nvPicPr>
+        <p:blipFill>
+          <a:blip r:embed="rId3"/>
+          <a:stretch>
+            <a:fillRect/>
+          </a:stretch>
+        </p:blipFill>
+        <p:spPr>
+          <a:xfrm>
+            <a:off x="2566810" y="778002"/>
+            <a:ext cx="9083827" cy="5090601"/>
+          </a:xfrm>
+          <a:prstGeom prst="rect">
+            <a:avLst/>
+          </a:prstGeom>
+        </p:spPr>
+      </p:pic>
+      <p:pic>
+        <p:nvPicPr>
+          <p:cNvPr id="5" name="Picture 4">
+            <a:extLst>
+              <a:ext uri="{FF2B5EF4-FFF2-40B4-BE49-F238E27FC236}">
+                <a16:creationId xmlns:a16="http://schemas.microsoft.com/office/drawing/2014/main" id="{8FA0AD0E-B671-A10A-2D40-E42F6F7E097E}"/>
+              </a:ext>
+            </a:extLst>
+          </p:cNvPr>
+          <p:cNvPicPr>
+            <a:picLocks noChangeAspect="1"/>
+          </p:cNvPicPr>
+          <p:nvPr/>
+        </p:nvPicPr>
+        <p:blipFill>
+          <a:blip r:embed="rId4"/>
+          <a:stretch>
+            <a:fillRect/>
+          </a:stretch>
+        </p:blipFill>
+        <p:spPr>
+          <a:xfrm>
+            <a:off x="177308" y="3932903"/>
+            <a:ext cx="4905970" cy="2749319"/>
+          </a:xfrm>
+          <a:prstGeom prst="rect">
+            <a:avLst/>
+          </a:prstGeom>
+        </p:spPr>
+      </p:pic>
+    </p:spTree>
+    <p:extLst>
+      <p:ext uri="{BB962C8B-B14F-4D97-AF65-F5344CB8AC3E}">
+        <p14:creationId xmlns:p14="http://schemas.microsoft.com/office/powerpoint/2010/main" val="2526697756"/>
+      </p:ext>
+    </p:extLst>
+  </p:cSld>
+  <p:clrMapOvr>
+    <a:masterClrMapping/>
+  </p:clrMapOvr>
+</p:sld>
+</file>
+
 <file path=ppt/theme/theme1.xml><?xml version="1.0" encoding="utf-8"?>
 <a:theme xmlns:a="http://schemas.openxmlformats.org/drawingml/2006/main" name="Office Theme">
   <a:themeElements>

</xml_diff>